<commit_message>
Update Range Trading - Trading Team 1.pptx
</commit_message>
<xml_diff>
--- a/Range Trading - Trading Team 1.pptx
+++ b/Range Trading - Trading Team 1.pptx
@@ -5,10 +5,10 @@
     <p:sldMasterId id="2147483685" r:id="rId4"/>
   </p:sldMasterIdLst>
   <p:notesMasterIdLst>
-    <p:notesMasterId r:id="rId17"/>
+    <p:notesMasterId r:id="rId16"/>
   </p:notesMasterIdLst>
   <p:handoutMasterIdLst>
-    <p:handoutMasterId r:id="rId18"/>
+    <p:handoutMasterId r:id="rId17"/>
   </p:handoutMasterIdLst>
   <p:sldIdLst>
     <p:sldId id="338" r:id="rId5"/>
@@ -20,9 +20,8 @@
     <p:sldId id="354" r:id="rId11"/>
     <p:sldId id="355" r:id="rId12"/>
     <p:sldId id="358" r:id="rId13"/>
-    <p:sldId id="356" r:id="rId14"/>
-    <p:sldId id="357" r:id="rId15"/>
-    <p:sldId id="342" r:id="rId16"/>
+    <p:sldId id="357" r:id="rId14"/>
+    <p:sldId id="342" r:id="rId15"/>
   </p:sldIdLst>
   <p:sldSz cx="12192000" cy="6858000"/>
   <p:notesSz cx="6858000" cy="9144000"/>
@@ -135,10 +134,1463 @@
 <file path=ppt/revisionInfo.xml><?xml version="1.0" encoding="utf-8"?>
 <p1510:revInfo xmlns:a="http://schemas.openxmlformats.org/drawingml/2006/main" xmlns:r="http://schemas.openxmlformats.org/officeDocument/2006/relationships" xmlns:p1510="http://schemas.microsoft.com/office/powerpoint/2015/10/main">
   <p1510:revLst>
-    <p1510:client id="{3D448EFD-A4FA-4309-B275-76E7422B54C0}" v="379" dt="2022-09-30T02:27:47.918"/>
+    <p1510:client id="{3D448EFD-A4FA-4309-B275-76E7422B54C0}" v="387" dt="2022-10-03T10:27:34.890"/>
     <p1510:client id="{4BB3BBCE-7D95-41F5-BC1E-3ACE61F61D21}" v="18" dt="2022-10-03T05:19:01.732"/>
   </p1510:revLst>
 </p1510:revInfo>
+</file>
+
+<file path=ppt/changesInfos/changesInfo1.xml><?xml version="1.0" encoding="utf-8"?>
+<pc:chgInfo xmlns:a="http://schemas.openxmlformats.org/drawingml/2006/main" xmlns:r="http://schemas.openxmlformats.org/officeDocument/2006/relationships" xmlns:ac="http://schemas.microsoft.com/office/drawing/2013/main/command" xmlns:pc="http://schemas.microsoft.com/office/powerpoint/2013/main/command">
+  <pc:docChgLst>
+    <pc:chgData name="Zachary Ching" userId="e8ded5238a264daa" providerId="LiveId" clId="{3D448EFD-A4FA-4309-B275-76E7422B54C0}"/>
+    <pc:docChg chg="undo redo custSel addSld delSld modSld sldOrd addMainMaster delMainMaster modMainMaster">
+      <pc:chgData name="Zachary Ching" userId="e8ded5238a264daa" providerId="LiveId" clId="{3D448EFD-A4FA-4309-B275-76E7422B54C0}" dt="2022-10-03T10:27:47.367" v="4245" actId="1076"/>
+      <pc:docMkLst>
+        <pc:docMk/>
+      </pc:docMkLst>
+      <pc:sldChg chg="delSp del">
+        <pc:chgData name="Zachary Ching" userId="e8ded5238a264daa" providerId="LiveId" clId="{3D448EFD-A4FA-4309-B275-76E7422B54C0}" dt="2022-09-28T15:19:25.001" v="67" actId="47"/>
+        <pc:sldMkLst>
+          <pc:docMk/>
+          <pc:sldMk cId="1426960031" sldId="262"/>
+        </pc:sldMkLst>
+        <pc:spChg chg="del">
+          <ac:chgData name="Zachary Ching" userId="e8ded5238a264daa" providerId="LiveId" clId="{3D448EFD-A4FA-4309-B275-76E7422B54C0}" dt="2022-09-28T15:18:25.646" v="61"/>
+          <ac:spMkLst>
+            <pc:docMk/>
+            <pc:sldMk cId="1426960031" sldId="262"/>
+            <ac:spMk id="2" creationId="{1A698657-AABB-7319-1272-42D2284A90D4}"/>
+          </ac:spMkLst>
+        </pc:spChg>
+      </pc:sldChg>
+      <pc:sldChg chg="delSp modSp mod">
+        <pc:chgData name="Zachary Ching" userId="e8ded5238a264daa" providerId="LiveId" clId="{3D448EFD-A4FA-4309-B275-76E7422B54C0}" dt="2022-09-29T17:40:51.307" v="1929" actId="20577"/>
+        <pc:sldMkLst>
+          <pc:docMk/>
+          <pc:sldMk cId="585127906" sldId="263"/>
+        </pc:sldMkLst>
+        <pc:spChg chg="mod">
+          <ac:chgData name="Zachary Ching" userId="e8ded5238a264daa" providerId="LiveId" clId="{3D448EFD-A4FA-4309-B275-76E7422B54C0}" dt="2022-09-29T17:40:51.307" v="1929" actId="20577"/>
+          <ac:spMkLst>
+            <pc:docMk/>
+            <pc:sldMk cId="585127906" sldId="263"/>
+            <ac:spMk id="2" creationId="{6F204F3F-D196-428C-AE74-238938FD8008}"/>
+          </ac:spMkLst>
+        </pc:spChg>
+        <pc:spChg chg="del">
+          <ac:chgData name="Zachary Ching" userId="e8ded5238a264daa" providerId="LiveId" clId="{3D448EFD-A4FA-4309-B275-76E7422B54C0}" dt="2022-09-28T15:18:25.646" v="61"/>
+          <ac:spMkLst>
+            <pc:docMk/>
+            <pc:sldMk cId="585127906" sldId="263"/>
+            <ac:spMk id="3" creationId="{B99B4B77-3F20-49E2-B544-1B652EAB9DDC}"/>
+          </ac:spMkLst>
+        </pc:spChg>
+      </pc:sldChg>
+      <pc:sldChg chg="delSp del">
+        <pc:chgData name="Zachary Ching" userId="e8ded5238a264daa" providerId="LiveId" clId="{3D448EFD-A4FA-4309-B275-76E7422B54C0}" dt="2022-09-29T16:26:01.003" v="874" actId="47"/>
+        <pc:sldMkLst>
+          <pc:docMk/>
+          <pc:sldMk cId="3162248394" sldId="264"/>
+        </pc:sldMkLst>
+        <pc:spChg chg="del">
+          <ac:chgData name="Zachary Ching" userId="e8ded5238a264daa" providerId="LiveId" clId="{3D448EFD-A4FA-4309-B275-76E7422B54C0}" dt="2022-09-28T15:18:25.646" v="61"/>
+          <ac:spMkLst>
+            <pc:docMk/>
+            <pc:sldMk cId="3162248394" sldId="264"/>
+            <ac:spMk id="3" creationId="{5199CB4F-1A57-6588-F058-C14946CF362A}"/>
+          </ac:spMkLst>
+        </pc:spChg>
+      </pc:sldChg>
+      <pc:sldChg chg="delSp del">
+        <pc:chgData name="Zachary Ching" userId="e8ded5238a264daa" providerId="LiveId" clId="{3D448EFD-A4FA-4309-B275-76E7422B54C0}" dt="2022-09-29T16:25:47.079" v="872" actId="47"/>
+        <pc:sldMkLst>
+          <pc:docMk/>
+          <pc:sldMk cId="3211941765" sldId="265"/>
+        </pc:sldMkLst>
+        <pc:spChg chg="del">
+          <ac:chgData name="Zachary Ching" userId="e8ded5238a264daa" providerId="LiveId" clId="{3D448EFD-A4FA-4309-B275-76E7422B54C0}" dt="2022-09-28T15:18:25.646" v="61"/>
+          <ac:spMkLst>
+            <pc:docMk/>
+            <pc:sldMk cId="3211941765" sldId="265"/>
+            <ac:spMk id="3" creationId="{893B7862-2186-7E64-951E-2E0892F0043C}"/>
+          </ac:spMkLst>
+        </pc:spChg>
+      </pc:sldChg>
+      <pc:sldChg chg="delSp del">
+        <pc:chgData name="Zachary Ching" userId="e8ded5238a264daa" providerId="LiveId" clId="{3D448EFD-A4FA-4309-B275-76E7422B54C0}" dt="2022-09-28T15:39:01.715" v="429" actId="47"/>
+        <pc:sldMkLst>
+          <pc:docMk/>
+          <pc:sldMk cId="681306790" sldId="266"/>
+        </pc:sldMkLst>
+        <pc:spChg chg="del">
+          <ac:chgData name="Zachary Ching" userId="e8ded5238a264daa" providerId="LiveId" clId="{3D448EFD-A4FA-4309-B275-76E7422B54C0}" dt="2022-09-28T15:18:25.646" v="61"/>
+          <ac:spMkLst>
+            <pc:docMk/>
+            <pc:sldMk cId="681306790" sldId="266"/>
+            <ac:spMk id="4" creationId="{A9CE8368-C9CC-7A56-97F5-FBC52208A6FD}"/>
+          </ac:spMkLst>
+        </pc:spChg>
+      </pc:sldChg>
+      <pc:sldChg chg="delSp modSp del mod ord">
+        <pc:chgData name="Zachary Ching" userId="e8ded5238a264daa" providerId="LiveId" clId="{3D448EFD-A4FA-4309-B275-76E7422B54C0}" dt="2022-09-29T16:26:32.941" v="883" actId="47"/>
+        <pc:sldMkLst>
+          <pc:docMk/>
+          <pc:sldMk cId="1976974393" sldId="268"/>
+        </pc:sldMkLst>
+        <pc:spChg chg="mod">
+          <ac:chgData name="Zachary Ching" userId="e8ded5238a264daa" providerId="LiveId" clId="{3D448EFD-A4FA-4309-B275-76E7422B54C0}" dt="2022-09-29T16:24:59.403" v="775" actId="20577"/>
+          <ac:spMkLst>
+            <pc:docMk/>
+            <pc:sldMk cId="1976974393" sldId="268"/>
+            <ac:spMk id="2" creationId="{86531FB3-8761-4C62-A879-97C144611878}"/>
+          </ac:spMkLst>
+        </pc:spChg>
+        <pc:spChg chg="del">
+          <ac:chgData name="Zachary Ching" userId="e8ded5238a264daa" providerId="LiveId" clId="{3D448EFD-A4FA-4309-B275-76E7422B54C0}" dt="2022-09-28T15:18:25.646" v="61"/>
+          <ac:spMkLst>
+            <pc:docMk/>
+            <pc:sldMk cId="1976974393" sldId="268"/>
+            <ac:spMk id="3" creationId="{959ECF45-0031-AC22-998C-13330AB601A3}"/>
+          </ac:spMkLst>
+        </pc:spChg>
+      </pc:sldChg>
+      <pc:sldChg chg="delSp del">
+        <pc:chgData name="Zachary Ching" userId="e8ded5238a264daa" providerId="LiveId" clId="{3D448EFD-A4FA-4309-B275-76E7422B54C0}" dt="2022-09-28T15:19:14.589" v="66" actId="47"/>
+        <pc:sldMkLst>
+          <pc:docMk/>
+          <pc:sldMk cId="2788093489" sldId="269"/>
+        </pc:sldMkLst>
+        <pc:spChg chg="del">
+          <ac:chgData name="Zachary Ching" userId="e8ded5238a264daa" providerId="LiveId" clId="{3D448EFD-A4FA-4309-B275-76E7422B54C0}" dt="2022-09-28T15:18:25.646" v="61"/>
+          <ac:spMkLst>
+            <pc:docMk/>
+            <pc:sldMk cId="2788093489" sldId="269"/>
+            <ac:spMk id="3" creationId="{8AB61DF5-51CD-8C5F-B33D-B34CC5B04050}"/>
+          </ac:spMkLst>
+        </pc:spChg>
+      </pc:sldChg>
+      <pc:sldChg chg="delSp del">
+        <pc:chgData name="Zachary Ching" userId="e8ded5238a264daa" providerId="LiveId" clId="{3D448EFD-A4FA-4309-B275-76E7422B54C0}" dt="2022-09-28T15:42:41.552" v="490" actId="47"/>
+        <pc:sldMkLst>
+          <pc:docMk/>
+          <pc:sldMk cId="1461117030" sldId="274"/>
+        </pc:sldMkLst>
+        <pc:spChg chg="del">
+          <ac:chgData name="Zachary Ching" userId="e8ded5238a264daa" providerId="LiveId" clId="{3D448EFD-A4FA-4309-B275-76E7422B54C0}" dt="2022-09-28T15:18:25.646" v="61"/>
+          <ac:spMkLst>
+            <pc:docMk/>
+            <pc:sldMk cId="1461117030" sldId="274"/>
+            <ac:spMk id="3" creationId="{E3D61877-1DC2-4F27-7F89-33DF718AAF4D}"/>
+          </ac:spMkLst>
+        </pc:spChg>
+      </pc:sldChg>
+      <pc:sldChg chg="addSp delSp modSp add del mod">
+        <pc:chgData name="Zachary Ching" userId="e8ded5238a264daa" providerId="LiveId" clId="{3D448EFD-A4FA-4309-B275-76E7422B54C0}" dt="2022-09-28T15:25:29.085" v="374" actId="47"/>
+        <pc:sldMkLst>
+          <pc:docMk/>
+          <pc:sldMk cId="3852521713" sldId="285"/>
+        </pc:sldMkLst>
+        <pc:spChg chg="add mod">
+          <ac:chgData name="Zachary Ching" userId="e8ded5238a264daa" providerId="LiveId" clId="{3D448EFD-A4FA-4309-B275-76E7422B54C0}" dt="2022-09-28T15:17:15.317" v="54" actId="478"/>
+          <ac:spMkLst>
+            <pc:docMk/>
+            <pc:sldMk cId="3852521713" sldId="285"/>
+            <ac:spMk id="3" creationId="{CE1FA55C-8650-8E35-1CE9-A3C13CA5DF14}"/>
+          </ac:spMkLst>
+        </pc:spChg>
+        <pc:spChg chg="add del mod ord">
+          <ac:chgData name="Zachary Ching" userId="e8ded5238a264daa" providerId="LiveId" clId="{3D448EFD-A4FA-4309-B275-76E7422B54C0}" dt="2022-09-28T15:19:07.810" v="65" actId="167"/>
+          <ac:spMkLst>
+            <pc:docMk/>
+            <pc:sldMk cId="3852521713" sldId="285"/>
+            <ac:spMk id="5" creationId="{C0C9B95D-78F5-58F9-DE83-C958B0F604DD}"/>
+          </ac:spMkLst>
+        </pc:spChg>
+        <pc:spChg chg="add mod">
+          <ac:chgData name="Zachary Ching" userId="e8ded5238a264daa" providerId="LiveId" clId="{3D448EFD-A4FA-4309-B275-76E7422B54C0}" dt="2022-09-28T15:17:16.292" v="56" actId="478"/>
+          <ac:spMkLst>
+            <pc:docMk/>
+            <pc:sldMk cId="3852521713" sldId="285"/>
+            <ac:spMk id="7" creationId="{A8F325FA-1C17-11DE-CFD5-E33F87318C62}"/>
+          </ac:spMkLst>
+        </pc:spChg>
+        <pc:spChg chg="del">
+          <ac:chgData name="Zachary Ching" userId="e8ded5238a264daa" providerId="LiveId" clId="{3D448EFD-A4FA-4309-B275-76E7422B54C0}" dt="2022-09-28T15:18:25.646" v="61"/>
+          <ac:spMkLst>
+            <pc:docMk/>
+            <pc:sldMk cId="3852521713" sldId="285"/>
+            <ac:spMk id="8" creationId="{31FAF458-52C1-4686-97DE-C3DDFA5D6C3D}"/>
+          </ac:spMkLst>
+        </pc:spChg>
+        <pc:spChg chg="mod">
+          <ac:chgData name="Zachary Ching" userId="e8ded5238a264daa" providerId="LiveId" clId="{3D448EFD-A4FA-4309-B275-76E7422B54C0}" dt="2022-09-28T15:17:13.079" v="53" actId="20577"/>
+          <ac:spMkLst>
+            <pc:docMk/>
+            <pc:sldMk cId="3852521713" sldId="285"/>
+            <ac:spMk id="12" creationId="{8BB1D2D3-565B-8645-85F7-41F999D96B52}"/>
+          </ac:spMkLst>
+        </pc:spChg>
+        <pc:picChg chg="del">
+          <ac:chgData name="Zachary Ching" userId="e8ded5238a264daa" providerId="LiveId" clId="{3D448EFD-A4FA-4309-B275-76E7422B54C0}" dt="2022-09-28T15:17:15.767" v="55" actId="478"/>
+          <ac:picMkLst>
+            <pc:docMk/>
+            <pc:sldMk cId="3852521713" sldId="285"/>
+            <ac:picMk id="31" creationId="{BEDAA8B5-CD18-5B4C-8E6D-80FCA8970DAF}"/>
+          </ac:picMkLst>
+        </pc:picChg>
+        <pc:picChg chg="del">
+          <ac:chgData name="Zachary Ching" userId="e8ded5238a264daa" providerId="LiveId" clId="{3D448EFD-A4FA-4309-B275-76E7422B54C0}" dt="2022-09-28T15:17:16.292" v="56" actId="478"/>
+          <ac:picMkLst>
+            <pc:docMk/>
+            <pc:sldMk cId="3852521713" sldId="285"/>
+            <ac:picMk id="33" creationId="{E70F7F78-29FD-3E49-BEFD-E20A8C71DD55}"/>
+          </ac:picMkLst>
+        </pc:picChg>
+        <pc:picChg chg="del">
+          <ac:chgData name="Zachary Ching" userId="e8ded5238a264daa" providerId="LiveId" clId="{3D448EFD-A4FA-4309-B275-76E7422B54C0}" dt="2022-09-28T15:17:15.317" v="54" actId="478"/>
+          <ac:picMkLst>
+            <pc:docMk/>
+            <pc:sldMk cId="3852521713" sldId="285"/>
+            <ac:picMk id="35" creationId="{914FB879-7F74-4546-ADF1-51C8C35FA91B}"/>
+          </ac:picMkLst>
+        </pc:picChg>
+      </pc:sldChg>
+      <pc:sldChg chg="addSp delSp modSp add del mod ord">
+        <pc:chgData name="Zachary Ching" userId="e8ded5238a264daa" providerId="LiveId" clId="{3D448EFD-A4FA-4309-B275-76E7422B54C0}" dt="2022-09-28T15:43:52.702" v="508" actId="47"/>
+        <pc:sldMkLst>
+          <pc:docMk/>
+          <pc:sldMk cId="3793086257" sldId="333"/>
+        </pc:sldMkLst>
+        <pc:spChg chg="del">
+          <ac:chgData name="Zachary Ching" userId="e8ded5238a264daa" providerId="LiveId" clId="{3D448EFD-A4FA-4309-B275-76E7422B54C0}" dt="2022-09-28T15:18:25.646" v="61"/>
+          <ac:spMkLst>
+            <pc:docMk/>
+            <pc:sldMk cId="3793086257" sldId="333"/>
+            <ac:spMk id="2" creationId="{65EE13CF-D4AA-3925-3BB4-0C10A2AEB422}"/>
+          </ac:spMkLst>
+        </pc:spChg>
+        <pc:spChg chg="add del mod">
+          <ac:chgData name="Zachary Ching" userId="e8ded5238a264daa" providerId="LiveId" clId="{3D448EFD-A4FA-4309-B275-76E7422B54C0}" dt="2022-09-28T15:41:19.144" v="451" actId="478"/>
+          <ac:spMkLst>
+            <pc:docMk/>
+            <pc:sldMk cId="3793086257" sldId="333"/>
+            <ac:spMk id="4" creationId="{50185FFC-5A63-919A-A30A-1AB2669EF8C7}"/>
+          </ac:spMkLst>
+        </pc:spChg>
+        <pc:spChg chg="add mod">
+          <ac:chgData name="Zachary Ching" userId="e8ded5238a264daa" providerId="LiveId" clId="{3D448EFD-A4FA-4309-B275-76E7422B54C0}" dt="2022-09-28T15:41:34.194" v="479" actId="20577"/>
+          <ac:spMkLst>
+            <pc:docMk/>
+            <pc:sldMk cId="3793086257" sldId="333"/>
+            <ac:spMk id="5" creationId="{BCF7FD91-29C5-B0E6-6077-1A85FAD39C61}"/>
+          </ac:spMkLst>
+        </pc:spChg>
+        <pc:spChg chg="mod">
+          <ac:chgData name="Zachary Ching" userId="e8ded5238a264daa" providerId="LiveId" clId="{3D448EFD-A4FA-4309-B275-76E7422B54C0}" dt="2022-09-28T15:41:50.692" v="483" actId="20577"/>
+          <ac:spMkLst>
+            <pc:docMk/>
+            <pc:sldMk cId="3793086257" sldId="333"/>
+            <ac:spMk id="11" creationId="{09B206E8-59BD-1B4C-8912-9A0443F96A4F}"/>
+          </ac:spMkLst>
+        </pc:spChg>
+        <pc:spChg chg="mod">
+          <ac:chgData name="Zachary Ching" userId="e8ded5238a264daa" providerId="LiveId" clId="{3D448EFD-A4FA-4309-B275-76E7422B54C0}" dt="2022-09-28T15:41:53.296" v="487" actId="20577"/>
+          <ac:spMkLst>
+            <pc:docMk/>
+            <pc:sldMk cId="3793086257" sldId="333"/>
+            <ac:spMk id="12" creationId="{2F06A708-C428-8443-AB48-F60A95FF71FE}"/>
+          </ac:spMkLst>
+        </pc:spChg>
+        <pc:picChg chg="del">
+          <ac:chgData name="Zachary Ching" userId="e8ded5238a264daa" providerId="LiveId" clId="{3D448EFD-A4FA-4309-B275-76E7422B54C0}" dt="2022-09-28T15:41:18.141" v="450" actId="478"/>
+          <ac:picMkLst>
+            <pc:docMk/>
+            <pc:sldMk cId="3793086257" sldId="333"/>
+            <ac:picMk id="24" creationId="{159A91E2-8BD3-6745-856E-8FA7F232E12B}"/>
+          </ac:picMkLst>
+        </pc:picChg>
+      </pc:sldChg>
+      <pc:sldChg chg="delSp modSp mod">
+        <pc:chgData name="Zachary Ching" userId="e8ded5238a264daa" providerId="LiveId" clId="{3D448EFD-A4FA-4309-B275-76E7422B54C0}" dt="2022-09-28T15:25:55.797" v="379" actId="313"/>
+        <pc:sldMkLst>
+          <pc:docMk/>
+          <pc:sldMk cId="217044100" sldId="338"/>
+        </pc:sldMkLst>
+        <pc:spChg chg="mod">
+          <ac:chgData name="Zachary Ching" userId="e8ded5238a264daa" providerId="LiveId" clId="{3D448EFD-A4FA-4309-B275-76E7422B54C0}" dt="2022-09-28T15:25:55.797" v="379" actId="313"/>
+          <ac:spMkLst>
+            <pc:docMk/>
+            <pc:sldMk cId="217044100" sldId="338"/>
+            <ac:spMk id="3" creationId="{171C4BF9-0712-B24C-9B29-1A941E18718E}"/>
+          </ac:spMkLst>
+        </pc:spChg>
+        <pc:spChg chg="del">
+          <ac:chgData name="Zachary Ching" userId="e8ded5238a264daa" providerId="LiveId" clId="{3D448EFD-A4FA-4309-B275-76E7422B54C0}" dt="2022-09-28T15:18:25.646" v="61"/>
+          <ac:spMkLst>
+            <pc:docMk/>
+            <pc:sldMk cId="217044100" sldId="338"/>
+            <ac:spMk id="4" creationId="{9DA2046C-89F6-476D-FD0D-E07A2E9ED7EB}"/>
+          </ac:spMkLst>
+        </pc:spChg>
+        <pc:picChg chg="mod">
+          <ac:chgData name="Zachary Ching" userId="e8ded5238a264daa" providerId="LiveId" clId="{3D448EFD-A4FA-4309-B275-76E7422B54C0}" dt="2022-09-28T15:24:41.477" v="362" actId="1076"/>
+          <ac:picMkLst>
+            <pc:docMk/>
+            <pc:sldMk cId="217044100" sldId="338"/>
+            <ac:picMk id="1026" creationId="{89E94AE7-4ED0-4D52-211E-180110591437}"/>
+          </ac:picMkLst>
+        </pc:picChg>
+      </pc:sldChg>
+      <pc:sldChg chg="delSp del">
+        <pc:chgData name="Zachary Ching" userId="e8ded5238a264daa" providerId="LiveId" clId="{3D448EFD-A4FA-4309-B275-76E7422B54C0}" dt="2022-09-28T15:38:55.366" v="427" actId="47"/>
+        <pc:sldMkLst>
+          <pc:docMk/>
+          <pc:sldMk cId="2058852336" sldId="339"/>
+        </pc:sldMkLst>
+        <pc:spChg chg="del">
+          <ac:chgData name="Zachary Ching" userId="e8ded5238a264daa" providerId="LiveId" clId="{3D448EFD-A4FA-4309-B275-76E7422B54C0}" dt="2022-09-28T15:18:25.646" v="61"/>
+          <ac:spMkLst>
+            <pc:docMk/>
+            <pc:sldMk cId="2058852336" sldId="339"/>
+            <ac:spMk id="2" creationId="{A76B1EE6-B22D-2C2E-870B-8C2FA73993E3}"/>
+          </ac:spMkLst>
+        </pc:spChg>
+      </pc:sldChg>
+      <pc:sldChg chg="delSp modSp mod">
+        <pc:chgData name="Zachary Ching" userId="e8ded5238a264daa" providerId="LiveId" clId="{3D448EFD-A4FA-4309-B275-76E7422B54C0}" dt="2022-09-28T15:44:13.118" v="566" actId="20577"/>
+        <pc:sldMkLst>
+          <pc:docMk/>
+          <pc:sldMk cId="617108373" sldId="340"/>
+        </pc:sldMkLst>
+        <pc:spChg chg="del">
+          <ac:chgData name="Zachary Ching" userId="e8ded5238a264daa" providerId="LiveId" clId="{3D448EFD-A4FA-4309-B275-76E7422B54C0}" dt="2022-09-28T15:18:25.646" v="61"/>
+          <ac:spMkLst>
+            <pc:docMk/>
+            <pc:sldMk cId="617108373" sldId="340"/>
+            <ac:spMk id="2" creationId="{50B3AD4A-7069-B4C1-D99D-AE21ABBC282B}"/>
+          </ac:spMkLst>
+        </pc:spChg>
+        <pc:spChg chg="mod">
+          <ac:chgData name="Zachary Ching" userId="e8ded5238a264daa" providerId="LiveId" clId="{3D448EFD-A4FA-4309-B275-76E7422B54C0}" dt="2022-09-28T15:44:13.118" v="566" actId="20577"/>
+          <ac:spMkLst>
+            <pc:docMk/>
+            <pc:sldMk cId="617108373" sldId="340"/>
+            <ac:spMk id="10" creationId="{8400AF68-FBA7-2C44-BB48-77A539765ED5}"/>
+          </ac:spMkLst>
+        </pc:spChg>
+      </pc:sldChg>
+      <pc:sldChg chg="addSp delSp modSp mod ord">
+        <pc:chgData name="Zachary Ching" userId="e8ded5238a264daa" providerId="LiveId" clId="{3D448EFD-A4FA-4309-B275-76E7422B54C0}" dt="2022-09-28T15:25:44.909" v="378" actId="1076"/>
+        <pc:sldMkLst>
+          <pc:docMk/>
+          <pc:sldMk cId="2435097111" sldId="342"/>
+        </pc:sldMkLst>
+        <pc:spChg chg="mod">
+          <ac:chgData name="Zachary Ching" userId="e8ded5238a264daa" providerId="LiveId" clId="{3D448EFD-A4FA-4309-B275-76E7422B54C0}" dt="2022-09-28T15:25:34.743" v="375" actId="1076"/>
+          <ac:spMkLst>
+            <pc:docMk/>
+            <pc:sldMk cId="2435097111" sldId="342"/>
+            <ac:spMk id="2" creationId="{6FECF6EF-906B-6B42-9DE3-1ACC6B1176DF}"/>
+          </ac:spMkLst>
+        </pc:spChg>
+        <pc:spChg chg="del mod">
+          <ac:chgData name="Zachary Ching" userId="e8ded5238a264daa" providerId="LiveId" clId="{3D448EFD-A4FA-4309-B275-76E7422B54C0}" dt="2022-09-28T15:24:10.212" v="343" actId="478"/>
+          <ac:spMkLst>
+            <pc:docMk/>
+            <pc:sldMk cId="2435097111" sldId="342"/>
+            <ac:spMk id="3" creationId="{A670338D-BB08-7E49-B1C1-DF19E7BA48B3}"/>
+          </ac:spMkLst>
+        </pc:spChg>
+        <pc:spChg chg="del">
+          <ac:chgData name="Zachary Ching" userId="e8ded5238a264daa" providerId="LiveId" clId="{3D448EFD-A4FA-4309-B275-76E7422B54C0}" dt="2022-09-28T15:18:25.646" v="61"/>
+          <ac:spMkLst>
+            <pc:docMk/>
+            <pc:sldMk cId="2435097111" sldId="342"/>
+            <ac:spMk id="4" creationId="{04B9FF7A-CA75-3F38-4911-9C86750AE557}"/>
+          </ac:spMkLst>
+        </pc:spChg>
+        <pc:picChg chg="add mod">
+          <ac:chgData name="Zachary Ching" userId="e8ded5238a264daa" providerId="LiveId" clId="{3D448EFD-A4FA-4309-B275-76E7422B54C0}" dt="2022-09-28T15:25:44.909" v="378" actId="1076"/>
+          <ac:picMkLst>
+            <pc:docMk/>
+            <pc:sldMk cId="2435097111" sldId="342"/>
+            <ac:picMk id="5" creationId="{DEE266D2-EA46-B908-E5F5-EAD5DD723E77}"/>
+          </ac:picMkLst>
+        </pc:picChg>
+      </pc:sldChg>
+      <pc:sldChg chg="addSp delSp modSp del mod">
+        <pc:chgData name="Zachary Ching" userId="e8ded5238a264daa" providerId="LiveId" clId="{3D448EFD-A4FA-4309-B275-76E7422B54C0}" dt="2022-09-28T15:38:49.889" v="425" actId="47"/>
+        <pc:sldMkLst>
+          <pc:docMk/>
+          <pc:sldMk cId="883680396" sldId="343"/>
+        </pc:sldMkLst>
+        <pc:spChg chg="del">
+          <ac:chgData name="Zachary Ching" userId="e8ded5238a264daa" providerId="LiveId" clId="{3D448EFD-A4FA-4309-B275-76E7422B54C0}" dt="2022-09-28T15:18:25.646" v="61"/>
+          <ac:spMkLst>
+            <pc:docMk/>
+            <pc:sldMk cId="883680396" sldId="343"/>
+            <ac:spMk id="3" creationId="{BB8752D3-6655-BBEF-AC10-3C825D5F16DF}"/>
+          </ac:spMkLst>
+        </pc:spChg>
+        <pc:spChg chg="add del mod">
+          <ac:chgData name="Zachary Ching" userId="e8ded5238a264daa" providerId="LiveId" clId="{3D448EFD-A4FA-4309-B275-76E7422B54C0}" dt="2022-09-28T15:37:20.114" v="410"/>
+          <ac:spMkLst>
+            <pc:docMk/>
+            <pc:sldMk cId="883680396" sldId="343"/>
+            <ac:spMk id="4" creationId="{95668156-385F-AFCF-89B0-C45D4C4127EB}"/>
+          </ac:spMkLst>
+        </pc:spChg>
+        <pc:spChg chg="add del mod">
+          <ac:chgData name="Zachary Ching" userId="e8ded5238a264daa" providerId="LiveId" clId="{3D448EFD-A4FA-4309-B275-76E7422B54C0}" dt="2022-09-28T15:37:20.114" v="410"/>
+          <ac:spMkLst>
+            <pc:docMk/>
+            <pc:sldMk cId="883680396" sldId="343"/>
+            <ac:spMk id="6" creationId="{C677201E-A853-B127-89AA-B9463C584F41}"/>
+          </ac:spMkLst>
+        </pc:spChg>
+        <pc:spChg chg="add del mod">
+          <ac:chgData name="Zachary Ching" userId="e8ded5238a264daa" providerId="LiveId" clId="{3D448EFD-A4FA-4309-B275-76E7422B54C0}" dt="2022-09-28T15:37:20.114" v="410"/>
+          <ac:spMkLst>
+            <pc:docMk/>
+            <pc:sldMk cId="883680396" sldId="343"/>
+            <ac:spMk id="7" creationId="{37A74276-22A4-2784-0B81-88E94A280AA3}"/>
+          </ac:spMkLst>
+        </pc:spChg>
+        <pc:spChg chg="add del mod">
+          <ac:chgData name="Zachary Ching" userId="e8ded5238a264daa" providerId="LiveId" clId="{3D448EFD-A4FA-4309-B275-76E7422B54C0}" dt="2022-09-28T15:37:20.114" v="410"/>
+          <ac:spMkLst>
+            <pc:docMk/>
+            <pc:sldMk cId="883680396" sldId="343"/>
+            <ac:spMk id="8" creationId="{88BCD8F3-A159-1567-FFAB-80C08BD14FEB}"/>
+          </ac:spMkLst>
+        </pc:spChg>
+        <pc:spChg chg="add del mod">
+          <ac:chgData name="Zachary Ching" userId="e8ded5238a264daa" providerId="LiveId" clId="{3D448EFD-A4FA-4309-B275-76E7422B54C0}" dt="2022-09-28T15:37:20.114" v="410"/>
+          <ac:spMkLst>
+            <pc:docMk/>
+            <pc:sldMk cId="883680396" sldId="343"/>
+            <ac:spMk id="9" creationId="{2DC22D21-21AE-B247-9248-3DAB515AA609}"/>
+          </ac:spMkLst>
+        </pc:spChg>
+        <pc:spChg chg="add del mod">
+          <ac:chgData name="Zachary Ching" userId="e8ded5238a264daa" providerId="LiveId" clId="{3D448EFD-A4FA-4309-B275-76E7422B54C0}" dt="2022-09-28T15:37:20.114" v="410"/>
+          <ac:spMkLst>
+            <pc:docMk/>
+            <pc:sldMk cId="883680396" sldId="343"/>
+            <ac:spMk id="10" creationId="{1EB2D094-FF87-A021-D0C8-113FF32FA44A}"/>
+          </ac:spMkLst>
+        </pc:spChg>
+        <pc:spChg chg="add del mod">
+          <ac:chgData name="Zachary Ching" userId="e8ded5238a264daa" providerId="LiveId" clId="{3D448EFD-A4FA-4309-B275-76E7422B54C0}" dt="2022-09-28T15:37:20.114" v="410"/>
+          <ac:spMkLst>
+            <pc:docMk/>
+            <pc:sldMk cId="883680396" sldId="343"/>
+            <ac:spMk id="11" creationId="{E6257822-EA52-35AB-13D9-8372C072B0D6}"/>
+          </ac:spMkLst>
+        </pc:spChg>
+        <pc:spChg chg="add del mod">
+          <ac:chgData name="Zachary Ching" userId="e8ded5238a264daa" providerId="LiveId" clId="{3D448EFD-A4FA-4309-B275-76E7422B54C0}" dt="2022-09-28T15:37:20.114" v="410"/>
+          <ac:spMkLst>
+            <pc:docMk/>
+            <pc:sldMk cId="883680396" sldId="343"/>
+            <ac:spMk id="12" creationId="{642A5776-071B-6141-F57B-52A596C2C8C3}"/>
+          </ac:spMkLst>
+        </pc:spChg>
+        <pc:spChg chg="add del mod">
+          <ac:chgData name="Zachary Ching" userId="e8ded5238a264daa" providerId="LiveId" clId="{3D448EFD-A4FA-4309-B275-76E7422B54C0}" dt="2022-09-28T15:38:13.176" v="420" actId="478"/>
+          <ac:spMkLst>
+            <pc:docMk/>
+            <pc:sldMk cId="883680396" sldId="343"/>
+            <ac:spMk id="14" creationId="{9F6799E8-5983-FCE3-8032-03D871EA2E8F}"/>
+          </ac:spMkLst>
+        </pc:spChg>
+        <pc:spChg chg="add del mod">
+          <ac:chgData name="Zachary Ching" userId="e8ded5238a264daa" providerId="LiveId" clId="{3D448EFD-A4FA-4309-B275-76E7422B54C0}" dt="2022-09-28T15:38:32.599" v="423" actId="1076"/>
+          <ac:spMkLst>
+            <pc:docMk/>
+            <pc:sldMk cId="883680396" sldId="343"/>
+            <ac:spMk id="15" creationId="{9E7F1653-EDB8-935B-C5E2-52F1A2CEB604}"/>
+          </ac:spMkLst>
+        </pc:spChg>
+        <pc:spChg chg="add del mod">
+          <ac:chgData name="Zachary Ching" userId="e8ded5238a264daa" providerId="LiveId" clId="{3D448EFD-A4FA-4309-B275-76E7422B54C0}" dt="2022-09-28T15:38:32.599" v="423" actId="1076"/>
+          <ac:spMkLst>
+            <pc:docMk/>
+            <pc:sldMk cId="883680396" sldId="343"/>
+            <ac:spMk id="16" creationId="{E2E65ABB-7C99-70B7-F52E-F853BE9D3654}"/>
+          </ac:spMkLst>
+        </pc:spChg>
+        <pc:spChg chg="add del mod">
+          <ac:chgData name="Zachary Ching" userId="e8ded5238a264daa" providerId="LiveId" clId="{3D448EFD-A4FA-4309-B275-76E7422B54C0}" dt="2022-09-28T15:38:32.599" v="423" actId="1076"/>
+          <ac:spMkLst>
+            <pc:docMk/>
+            <pc:sldMk cId="883680396" sldId="343"/>
+            <ac:spMk id="17" creationId="{BAE6BF5F-D4CE-A46B-17EE-24A977F30EFE}"/>
+          </ac:spMkLst>
+        </pc:spChg>
+        <pc:spChg chg="add del mod">
+          <ac:chgData name="Zachary Ching" userId="e8ded5238a264daa" providerId="LiveId" clId="{3D448EFD-A4FA-4309-B275-76E7422B54C0}" dt="2022-09-28T15:38:32.599" v="423" actId="1076"/>
+          <ac:spMkLst>
+            <pc:docMk/>
+            <pc:sldMk cId="883680396" sldId="343"/>
+            <ac:spMk id="18" creationId="{825AEC05-E315-A9FF-9BF1-D03C5D58DB42}"/>
+          </ac:spMkLst>
+        </pc:spChg>
+        <pc:spChg chg="add del mod">
+          <ac:chgData name="Zachary Ching" userId="e8ded5238a264daa" providerId="LiveId" clId="{3D448EFD-A4FA-4309-B275-76E7422B54C0}" dt="2022-09-28T15:38:32.599" v="423" actId="1076"/>
+          <ac:spMkLst>
+            <pc:docMk/>
+            <pc:sldMk cId="883680396" sldId="343"/>
+            <ac:spMk id="19" creationId="{E520D35E-6B54-5B33-2785-AD7C11C524B1}"/>
+          </ac:spMkLst>
+        </pc:spChg>
+        <pc:spChg chg="add del mod">
+          <ac:chgData name="Zachary Ching" userId="e8ded5238a264daa" providerId="LiveId" clId="{3D448EFD-A4FA-4309-B275-76E7422B54C0}" dt="2022-09-28T15:38:32.599" v="423" actId="1076"/>
+          <ac:spMkLst>
+            <pc:docMk/>
+            <pc:sldMk cId="883680396" sldId="343"/>
+            <ac:spMk id="20" creationId="{9139DFA4-7F48-337A-8405-5D0D86C8FCD2}"/>
+          </ac:spMkLst>
+        </pc:spChg>
+        <pc:spChg chg="add del mod">
+          <ac:chgData name="Zachary Ching" userId="e8ded5238a264daa" providerId="LiveId" clId="{3D448EFD-A4FA-4309-B275-76E7422B54C0}" dt="2022-09-28T15:38:32.599" v="423" actId="1076"/>
+          <ac:spMkLst>
+            <pc:docMk/>
+            <pc:sldMk cId="883680396" sldId="343"/>
+            <ac:spMk id="21" creationId="{06450A6A-DBB7-4B0E-DF89-EF5C7E5EF407}"/>
+          </ac:spMkLst>
+        </pc:spChg>
+        <pc:spChg chg="add del mod">
+          <ac:chgData name="Zachary Ching" userId="e8ded5238a264daa" providerId="LiveId" clId="{3D448EFD-A4FA-4309-B275-76E7422B54C0}" dt="2022-09-28T15:38:32.599" v="423" actId="1076"/>
+          <ac:spMkLst>
+            <pc:docMk/>
+            <pc:sldMk cId="883680396" sldId="343"/>
+            <ac:spMk id="22" creationId="{ADFF5436-B075-65F9-2912-882F62E4EBFD}"/>
+          </ac:spMkLst>
+        </pc:spChg>
+        <pc:graphicFrameChg chg="del">
+          <ac:chgData name="Zachary Ching" userId="e8ded5238a264daa" providerId="LiveId" clId="{3D448EFD-A4FA-4309-B275-76E7422B54C0}" dt="2022-09-28T15:37:23.708" v="411" actId="478"/>
+          <ac:graphicFrameMkLst>
+            <pc:docMk/>
+            <pc:sldMk cId="883680396" sldId="343"/>
+            <ac:graphicFrameMk id="5" creationId="{2A1099A9-7898-E54F-BE1A-0E468D8CEA8B}"/>
+          </ac:graphicFrameMkLst>
+        </pc:graphicFrameChg>
+      </pc:sldChg>
+      <pc:sldChg chg="delSp del">
+        <pc:chgData name="Zachary Ching" userId="e8ded5238a264daa" providerId="LiveId" clId="{3D448EFD-A4FA-4309-B275-76E7422B54C0}" dt="2022-09-28T15:38:52.442" v="426" actId="47"/>
+        <pc:sldMkLst>
+          <pc:docMk/>
+          <pc:sldMk cId="440266514" sldId="344"/>
+        </pc:sldMkLst>
+        <pc:spChg chg="del">
+          <ac:chgData name="Zachary Ching" userId="e8ded5238a264daa" providerId="LiveId" clId="{3D448EFD-A4FA-4309-B275-76E7422B54C0}" dt="2022-09-28T15:18:25.646" v="61"/>
+          <ac:spMkLst>
+            <pc:docMk/>
+            <pc:sldMk cId="440266514" sldId="344"/>
+            <ac:spMk id="2" creationId="{96875BDD-38D1-EF96-9CE5-3C6ADC7267B8}"/>
+          </ac:spMkLst>
+        </pc:spChg>
+      </pc:sldChg>
+      <pc:sldChg chg="delSp del">
+        <pc:chgData name="Zachary Ching" userId="e8ded5238a264daa" providerId="LiveId" clId="{3D448EFD-A4FA-4309-B275-76E7422B54C0}" dt="2022-09-29T16:25:58.816" v="873" actId="47"/>
+        <pc:sldMkLst>
+          <pc:docMk/>
+          <pc:sldMk cId="881188039" sldId="345"/>
+        </pc:sldMkLst>
+        <pc:spChg chg="del">
+          <ac:chgData name="Zachary Ching" userId="e8ded5238a264daa" providerId="LiveId" clId="{3D448EFD-A4FA-4309-B275-76E7422B54C0}" dt="2022-09-28T15:18:25.646" v="61"/>
+          <ac:spMkLst>
+            <pc:docMk/>
+            <pc:sldMk cId="881188039" sldId="345"/>
+            <ac:spMk id="7" creationId="{A45237D9-559D-6529-CEF2-096F3CCE686E}"/>
+          </ac:spMkLst>
+        </pc:spChg>
+      </pc:sldChg>
+      <pc:sldChg chg="add del">
+        <pc:chgData name="Zachary Ching" userId="e8ded5238a264daa" providerId="LiveId" clId="{3D448EFD-A4FA-4309-B275-76E7422B54C0}" dt="2022-09-28T15:38:59.978" v="428" actId="47"/>
+        <pc:sldMkLst>
+          <pc:docMk/>
+          <pc:sldMk cId="3507718482" sldId="346"/>
+        </pc:sldMkLst>
+      </pc:sldChg>
+      <pc:sldChg chg="del">
+        <pc:chgData name="Zachary Ching" userId="e8ded5238a264daa" providerId="LiveId" clId="{3D448EFD-A4FA-4309-B275-76E7422B54C0}" dt="2022-09-28T15:17:02.887" v="0" actId="47"/>
+        <pc:sldMkLst>
+          <pc:docMk/>
+          <pc:sldMk cId="4009153543" sldId="346"/>
+        </pc:sldMkLst>
+      </pc:sldChg>
+      <pc:sldChg chg="new del">
+        <pc:chgData name="Zachary Ching" userId="e8ded5238a264daa" providerId="LiveId" clId="{3D448EFD-A4FA-4309-B275-76E7422B54C0}" dt="2022-09-28T15:43:08.185" v="494" actId="47"/>
+        <pc:sldMkLst>
+          <pc:docMk/>
+          <pc:sldMk cId="1622920347" sldId="347"/>
+        </pc:sldMkLst>
+      </pc:sldChg>
+      <pc:sldChg chg="addSp delSp modSp add del mod ord">
+        <pc:chgData name="Zachary Ching" userId="e8ded5238a264daa" providerId="LiveId" clId="{3D448EFD-A4FA-4309-B275-76E7422B54C0}" dt="2022-09-29T17:45:55.053" v="3002" actId="47"/>
+        <pc:sldMkLst>
+          <pc:docMk/>
+          <pc:sldMk cId="816959413" sldId="351"/>
+        </pc:sldMkLst>
+        <pc:spChg chg="mod">
+          <ac:chgData name="Zachary Ching" userId="e8ded5238a264daa" providerId="LiveId" clId="{3D448EFD-A4FA-4309-B275-76E7422B54C0}" dt="2022-09-28T15:41:04.795" v="449" actId="20577"/>
+          <ac:spMkLst>
+            <pc:docMk/>
+            <pc:sldMk cId="816959413" sldId="351"/>
+            <ac:spMk id="3" creationId="{52C29261-AA82-C7F4-509C-D8B5928D77CE}"/>
+          </ac:spMkLst>
+        </pc:spChg>
+        <pc:spChg chg="mod">
+          <ac:chgData name="Zachary Ching" userId="e8ded5238a264daa" providerId="LiveId" clId="{3D448EFD-A4FA-4309-B275-76E7422B54C0}" dt="2022-09-28T15:41:03.210" v="448" actId="20577"/>
+          <ac:spMkLst>
+            <pc:docMk/>
+            <pc:sldMk cId="816959413" sldId="351"/>
+            <ac:spMk id="18" creationId="{A834161B-37CF-2C4E-8F39-D0FF72D7AD76}"/>
+          </ac:spMkLst>
+        </pc:spChg>
+        <pc:spChg chg="add del mod">
+          <ac:chgData name="Zachary Ching" userId="e8ded5238a264daa" providerId="LiveId" clId="{3D448EFD-A4FA-4309-B275-76E7422B54C0}" dt="2022-09-28T15:40:48.522" v="438" actId="20577"/>
+          <ac:spMkLst>
+            <pc:docMk/>
+            <pc:sldMk cId="816959413" sldId="351"/>
+            <ac:spMk id="25" creationId="{FAF99F8F-55F7-F84F-B8EF-951E96C1C956}"/>
+          </ac:spMkLst>
+        </pc:spChg>
+        <pc:spChg chg="mod">
+          <ac:chgData name="Zachary Ching" userId="e8ded5238a264daa" providerId="LiveId" clId="{3D448EFD-A4FA-4309-B275-76E7422B54C0}" dt="2022-09-28T15:41:01.332" v="447" actId="20577"/>
+          <ac:spMkLst>
+            <pc:docMk/>
+            <pc:sldMk cId="816959413" sldId="351"/>
+            <ac:spMk id="29" creationId="{E32B9AA9-8344-6845-9390-8B0A4A247847}"/>
+          </ac:spMkLst>
+        </pc:spChg>
+        <pc:spChg chg="mod">
+          <ac:chgData name="Zachary Ching" userId="e8ded5238a264daa" providerId="LiveId" clId="{3D448EFD-A4FA-4309-B275-76E7422B54C0}" dt="2022-09-28T15:40:54.488" v="445" actId="20577"/>
+          <ac:spMkLst>
+            <pc:docMk/>
+            <pc:sldMk cId="816959413" sldId="351"/>
+            <ac:spMk id="32" creationId="{A318E169-FA84-074D-9C76-A932721F9658}"/>
+          </ac:spMkLst>
+        </pc:spChg>
+        <pc:spChg chg="mod">
+          <ac:chgData name="Zachary Ching" userId="e8ded5238a264daa" providerId="LiveId" clId="{3D448EFD-A4FA-4309-B275-76E7422B54C0}" dt="2022-09-28T15:40:59.779" v="446" actId="20577"/>
+          <ac:spMkLst>
+            <pc:docMk/>
+            <pc:sldMk cId="816959413" sldId="351"/>
+            <ac:spMk id="33" creationId="{DB655435-9985-7E49-88E0-16B1D3D1AB5C}"/>
+          </ac:spMkLst>
+        </pc:spChg>
+        <pc:spChg chg="mod">
+          <ac:chgData name="Zachary Ching" userId="e8ded5238a264daa" providerId="LiveId" clId="{3D448EFD-A4FA-4309-B275-76E7422B54C0}" dt="2022-09-28T15:40:43.145" v="434" actId="20577"/>
+          <ac:spMkLst>
+            <pc:docMk/>
+            <pc:sldMk cId="816959413" sldId="351"/>
+            <ac:spMk id="36" creationId="{5F759FF1-0379-A547-AD96-B715BDFC53F9}"/>
+          </ac:spMkLst>
+        </pc:spChg>
+      </pc:sldChg>
+      <pc:sldChg chg="new del">
+        <pc:chgData name="Zachary Ching" userId="e8ded5238a264daa" providerId="LiveId" clId="{3D448EFD-A4FA-4309-B275-76E7422B54C0}" dt="2022-09-28T15:43:39.917" v="502" actId="680"/>
+        <pc:sldMkLst>
+          <pc:docMk/>
+          <pc:sldMk cId="1031635254" sldId="352"/>
+        </pc:sldMkLst>
+      </pc:sldChg>
+      <pc:sldChg chg="modSp new mod ord modShow">
+        <pc:chgData name="Zachary Ching" userId="e8ded5238a264daa" providerId="LiveId" clId="{3D448EFD-A4FA-4309-B275-76E7422B54C0}" dt="2022-10-03T10:14:11.583" v="3811" actId="20577"/>
+        <pc:sldMkLst>
+          <pc:docMk/>
+          <pc:sldMk cId="3809894193" sldId="352"/>
+        </pc:sldMkLst>
+        <pc:spChg chg="mod">
+          <ac:chgData name="Zachary Ching" userId="e8ded5238a264daa" providerId="LiveId" clId="{3D448EFD-A4FA-4309-B275-76E7422B54C0}" dt="2022-10-02T14:10:02.098" v="3037" actId="1076"/>
+          <ac:spMkLst>
+            <pc:docMk/>
+            <pc:sldMk cId="3809894193" sldId="352"/>
+            <ac:spMk id="2" creationId="{0FE53070-B3DE-711F-77CB-0879FA014043}"/>
+          </ac:spMkLst>
+        </pc:spChg>
+        <pc:spChg chg="mod">
+          <ac:chgData name="Zachary Ching" userId="e8ded5238a264daa" providerId="LiveId" clId="{3D448EFD-A4FA-4309-B275-76E7422B54C0}" dt="2022-10-03T10:14:11.583" v="3811" actId="20577"/>
+          <ac:spMkLst>
+            <pc:docMk/>
+            <pc:sldMk cId="3809894193" sldId="352"/>
+            <ac:spMk id="3" creationId="{A705CE76-78EC-49E5-8C2C-8C03C2778573}"/>
+          </ac:spMkLst>
+        </pc:spChg>
+        <pc:spChg chg="mod">
+          <ac:chgData name="Zachary Ching" userId="e8ded5238a264daa" providerId="LiveId" clId="{3D448EFD-A4FA-4309-B275-76E7422B54C0}" dt="2022-09-28T15:44:09.080" v="565" actId="20577"/>
+          <ac:spMkLst>
+            <pc:docMk/>
+            <pc:sldMk cId="3809894193" sldId="352"/>
+            <ac:spMk id="4" creationId="{DDA547C0-A979-85EB-A748-7074D3254391}"/>
+          </ac:spMkLst>
+        </pc:spChg>
+      </pc:sldChg>
+      <pc:sldChg chg="addSp modSp new mod ord">
+        <pc:chgData name="Zachary Ching" userId="e8ded5238a264daa" providerId="LiveId" clId="{3D448EFD-A4FA-4309-B275-76E7422B54C0}" dt="2022-09-29T17:49:41.045" v="3028" actId="20577"/>
+        <pc:sldMkLst>
+          <pc:docMk/>
+          <pc:sldMk cId="3500329031" sldId="353"/>
+        </pc:sldMkLst>
+        <pc:spChg chg="mod">
+          <ac:chgData name="Zachary Ching" userId="e8ded5238a264daa" providerId="LiveId" clId="{3D448EFD-A4FA-4309-B275-76E7422B54C0}" dt="2022-09-29T17:49:41.045" v="3028" actId="20577"/>
+          <ac:spMkLst>
+            <pc:docMk/>
+            <pc:sldMk cId="3500329031" sldId="353"/>
+            <ac:spMk id="2" creationId="{81D8E09F-20B8-F9D9-80B2-92686521496E}"/>
+          </ac:spMkLst>
+        </pc:spChg>
+        <pc:spChg chg="mod">
+          <ac:chgData name="Zachary Ching" userId="e8ded5238a264daa" providerId="LiveId" clId="{3D448EFD-A4FA-4309-B275-76E7422B54C0}" dt="2022-09-29T17:49:28.842" v="3027" actId="14100"/>
+          <ac:spMkLst>
+            <pc:docMk/>
+            <pc:sldMk cId="3500329031" sldId="353"/>
+            <ac:spMk id="3" creationId="{3E7F31BD-E299-5F5F-E0D1-3A487185736D}"/>
+          </ac:spMkLst>
+        </pc:spChg>
+        <pc:picChg chg="add mod">
+          <ac:chgData name="Zachary Ching" userId="e8ded5238a264daa" providerId="LiveId" clId="{3D448EFD-A4FA-4309-B275-76E7422B54C0}" dt="2022-09-29T17:49:19.820" v="3025" actId="1076"/>
+          <ac:picMkLst>
+            <pc:docMk/>
+            <pc:sldMk cId="3500329031" sldId="353"/>
+            <ac:picMk id="5" creationId="{AC4B1D9E-E15D-41A0-EDF0-F5E25DCB305B}"/>
+          </ac:picMkLst>
+        </pc:picChg>
+      </pc:sldChg>
+      <pc:sldChg chg="modSp new del mod ord">
+        <pc:chgData name="Zachary Ching" userId="e8ded5238a264daa" providerId="LiveId" clId="{3D448EFD-A4FA-4309-B275-76E7422B54C0}" dt="2022-10-03T10:17:41.154" v="3889" actId="47"/>
+        <pc:sldMkLst>
+          <pc:docMk/>
+          <pc:sldMk cId="1691172745" sldId="356"/>
+        </pc:sldMkLst>
+        <pc:spChg chg="mod">
+          <ac:chgData name="Zachary Ching" userId="e8ded5238a264daa" providerId="LiveId" clId="{3D448EFD-A4FA-4309-B275-76E7422B54C0}" dt="2022-10-03T10:17:34.012" v="3884" actId="21"/>
+          <ac:spMkLst>
+            <pc:docMk/>
+            <pc:sldMk cId="1691172745" sldId="356"/>
+            <ac:spMk id="2" creationId="{10FC207A-EFFB-297D-1550-C8A5AC06687B}"/>
+          </ac:spMkLst>
+        </pc:spChg>
+        <pc:spChg chg="mod">
+          <ac:chgData name="Zachary Ching" userId="e8ded5238a264daa" providerId="LiveId" clId="{3D448EFD-A4FA-4309-B275-76E7422B54C0}" dt="2022-09-29T16:25:33.425" v="850" actId="20577"/>
+          <ac:spMkLst>
+            <pc:docMk/>
+            <pc:sldMk cId="1691172745" sldId="356"/>
+            <ac:spMk id="4" creationId="{33F21473-DD52-D1EF-D355-A4B08B6B58D0}"/>
+          </ac:spMkLst>
+        </pc:spChg>
+      </pc:sldChg>
+      <pc:sldChg chg="addSp modSp new mod ord modShow">
+        <pc:chgData name="Zachary Ching" userId="e8ded5238a264daa" providerId="LiveId" clId="{3D448EFD-A4FA-4309-B275-76E7422B54C0}" dt="2022-10-03T10:27:47.367" v="4245" actId="1076"/>
+        <pc:sldMkLst>
+          <pc:docMk/>
+          <pc:sldMk cId="2978631845" sldId="357"/>
+        </pc:sldMkLst>
+        <pc:spChg chg="mod">
+          <ac:chgData name="Zachary Ching" userId="e8ded5238a264daa" providerId="LiveId" clId="{3D448EFD-A4FA-4309-B275-76E7422B54C0}" dt="2022-10-03T10:27:20" v="4220" actId="20577"/>
+          <ac:spMkLst>
+            <pc:docMk/>
+            <pc:sldMk cId="2978631845" sldId="357"/>
+            <ac:spMk id="2" creationId="{28420556-8254-54BF-0146-EBBA61D90A60}"/>
+          </ac:spMkLst>
+        </pc:spChg>
+        <pc:spChg chg="mod">
+          <ac:chgData name="Zachary Ching" userId="e8ded5238a264daa" providerId="LiveId" clId="{3D448EFD-A4FA-4309-B275-76E7422B54C0}" dt="2022-09-29T16:25:41.420" v="871" actId="20577"/>
+          <ac:spMkLst>
+            <pc:docMk/>
+            <pc:sldMk cId="2978631845" sldId="357"/>
+            <ac:spMk id="4" creationId="{69E47665-15AD-DCFF-9C8D-A63BA68870EF}"/>
+          </ac:spMkLst>
+        </pc:spChg>
+        <pc:spChg chg="add mod">
+          <ac:chgData name="Zachary Ching" userId="e8ded5238a264daa" providerId="LiveId" clId="{3D448EFD-A4FA-4309-B275-76E7422B54C0}" dt="2022-10-03T10:27:47.367" v="4245" actId="1076"/>
+          <ac:spMkLst>
+            <pc:docMk/>
+            <pc:sldMk cId="2978631845" sldId="357"/>
+            <ac:spMk id="7" creationId="{5E427509-0E51-698A-CF76-3E630B30592D}"/>
+          </ac:spMkLst>
+        </pc:spChg>
+        <pc:picChg chg="mod">
+          <ac:chgData name="Zachary Ching" userId="e8ded5238a264daa" providerId="LiveId" clId="{3D448EFD-A4FA-4309-B275-76E7422B54C0}" dt="2022-10-03T10:27:24.141" v="4221" actId="14100"/>
+          <ac:picMkLst>
+            <pc:docMk/>
+            <pc:sldMk cId="2978631845" sldId="357"/>
+            <ac:picMk id="5" creationId="{39646156-15DA-669D-31CE-7327DACCE356}"/>
+          </ac:picMkLst>
+        </pc:picChg>
+        <pc:picChg chg="mod">
+          <ac:chgData name="Zachary Ching" userId="e8ded5238a264daa" providerId="LiveId" clId="{3D448EFD-A4FA-4309-B275-76E7422B54C0}" dt="2022-10-03T10:27:27.758" v="4223" actId="1076"/>
+          <ac:picMkLst>
+            <pc:docMk/>
+            <pc:sldMk cId="2978631845" sldId="357"/>
+            <ac:picMk id="6" creationId="{1AB1F8C5-3B90-68C6-35CA-5880EC182E31}"/>
+          </ac:picMkLst>
+        </pc:picChg>
+      </pc:sldChg>
+      <pc:sldChg chg="addSp delSp modSp new mod">
+        <pc:chgData name="Zachary Ching" userId="e8ded5238a264daa" providerId="LiveId" clId="{3D448EFD-A4FA-4309-B275-76E7422B54C0}" dt="2022-10-03T10:11:37.512" v="3317" actId="20577"/>
+        <pc:sldMkLst>
+          <pc:docMk/>
+          <pc:sldMk cId="2865554104" sldId="358"/>
+        </pc:sldMkLst>
+        <pc:spChg chg="mod">
+          <ac:chgData name="Zachary Ching" userId="e8ded5238a264daa" providerId="LiveId" clId="{3D448EFD-A4FA-4309-B275-76E7422B54C0}" dt="2022-10-03T10:11:37.512" v="3317" actId="20577"/>
+          <ac:spMkLst>
+            <pc:docMk/>
+            <pc:sldMk cId="2865554104" sldId="358"/>
+            <ac:spMk id="2" creationId="{A62553B2-F48A-C6CD-598D-065DE52BF1F0}"/>
+          </ac:spMkLst>
+        </pc:spChg>
+        <pc:spChg chg="add del mod">
+          <ac:chgData name="Zachary Ching" userId="e8ded5238a264daa" providerId="LiveId" clId="{3D448EFD-A4FA-4309-B275-76E7422B54C0}" dt="2022-10-03T10:10:05.883" v="3050"/>
+          <ac:spMkLst>
+            <pc:docMk/>
+            <pc:sldMk cId="2865554104" sldId="358"/>
+            <ac:spMk id="3" creationId="{22B18F6A-9789-5A5A-39AD-D9F8D0B40CB4}"/>
+          </ac:spMkLst>
+        </pc:spChg>
+        <pc:spChg chg="mod">
+          <ac:chgData name="Zachary Ching" userId="e8ded5238a264daa" providerId="LiveId" clId="{3D448EFD-A4FA-4309-B275-76E7422B54C0}" dt="2022-09-29T17:41:15.622" v="1956" actId="20577"/>
+          <ac:spMkLst>
+            <pc:docMk/>
+            <pc:sldMk cId="2865554104" sldId="358"/>
+            <ac:spMk id="4" creationId="{52D9FCF1-9E25-8006-2E51-7D618A764AAF}"/>
+          </ac:spMkLst>
+        </pc:spChg>
+        <pc:picChg chg="add del mod">
+          <ac:chgData name="Zachary Ching" userId="e8ded5238a264daa" providerId="LiveId" clId="{3D448EFD-A4FA-4309-B275-76E7422B54C0}" dt="2022-10-03T10:05:54.764" v="3042" actId="931"/>
+          <ac:picMkLst>
+            <pc:docMk/>
+            <pc:sldMk cId="2865554104" sldId="358"/>
+            <ac:picMk id="6" creationId="{94F0EA55-E274-4581-E894-F3A5064A9AB3}"/>
+          </ac:picMkLst>
+        </pc:picChg>
+        <pc:picChg chg="add del mod">
+          <ac:chgData name="Zachary Ching" userId="e8ded5238a264daa" providerId="LiveId" clId="{3D448EFD-A4FA-4309-B275-76E7422B54C0}" dt="2022-10-03T10:09:44.393" v="3047" actId="931"/>
+          <ac:picMkLst>
+            <pc:docMk/>
+            <pc:sldMk cId="2865554104" sldId="358"/>
+            <ac:picMk id="8" creationId="{CA1E131D-9AD8-1074-31AE-1DF65E9F71ED}"/>
+          </ac:picMkLst>
+        </pc:picChg>
+        <pc:picChg chg="add del mod">
+          <ac:chgData name="Zachary Ching" userId="e8ded5238a264daa" providerId="LiveId" clId="{3D448EFD-A4FA-4309-B275-76E7422B54C0}" dt="2022-10-03T10:09:54.816" v="3049" actId="931"/>
+          <ac:picMkLst>
+            <pc:docMk/>
+            <pc:sldMk cId="2865554104" sldId="358"/>
+            <ac:picMk id="10" creationId="{4C982827-228F-DC57-7316-CB18E678E896}"/>
+          </ac:picMkLst>
+        </pc:picChg>
+        <pc:picChg chg="add mod modCrop">
+          <ac:chgData name="Zachary Ching" userId="e8ded5238a264daa" providerId="LiveId" clId="{3D448EFD-A4FA-4309-B275-76E7422B54C0}" dt="2022-10-03T10:10:23.827" v="3056" actId="14100"/>
+          <ac:picMkLst>
+            <pc:docMk/>
+            <pc:sldMk cId="2865554104" sldId="358"/>
+            <ac:picMk id="12" creationId="{D3AC1957-9275-4A92-CBC7-C0DEFBFF28F4}"/>
+          </ac:picMkLst>
+        </pc:picChg>
+      </pc:sldChg>
+      <pc:sldMasterChg chg="add del addSldLayout delSldLayout">
+        <pc:chgData name="Zachary Ching" userId="e8ded5238a264daa" providerId="LiveId" clId="{3D448EFD-A4FA-4309-B275-76E7422B54C0}" dt="2022-09-28T15:38:59.978" v="428" actId="47"/>
+        <pc:sldMasterMkLst>
+          <pc:docMk/>
+          <pc:sldMasterMk cId="3746097548" sldId="2147483648"/>
+        </pc:sldMasterMkLst>
+        <pc:sldLayoutChg chg="add del">
+          <pc:chgData name="Zachary Ching" userId="e8ded5238a264daa" providerId="LiveId" clId="{3D448EFD-A4FA-4309-B275-76E7422B54C0}" dt="2022-09-28T15:38:59.978" v="428" actId="47"/>
+          <pc:sldLayoutMkLst>
+            <pc:docMk/>
+            <pc:sldMasterMk cId="3746097548" sldId="2147483648"/>
+            <pc:sldLayoutMk cId="3514887780" sldId="2147483660"/>
+          </pc:sldLayoutMkLst>
+        </pc:sldLayoutChg>
+      </pc:sldMasterChg>
+      <pc:sldMasterChg chg="delSldLayout modSldLayout sldLayoutOrd">
+        <pc:chgData name="Zachary Ching" userId="e8ded5238a264daa" providerId="LiveId" clId="{3D448EFD-A4FA-4309-B275-76E7422B54C0}" dt="2022-09-28T15:43:40.360" v="503" actId="478"/>
+        <pc:sldMasterMkLst>
+          <pc:docMk/>
+          <pc:sldMasterMk cId="124448909" sldId="2147483685"/>
+        </pc:sldMasterMkLst>
+        <pc:sldLayoutChg chg="ord">
+          <pc:chgData name="Zachary Ching" userId="e8ded5238a264daa" providerId="LiveId" clId="{3D448EFD-A4FA-4309-B275-76E7422B54C0}" dt="2022-09-28T15:39:17.814" v="432" actId="20578"/>
+          <pc:sldLayoutMkLst>
+            <pc:docMk/>
+            <pc:sldMasterMk cId="124448909" sldId="2147483685"/>
+            <pc:sldLayoutMk cId="3661439154" sldId="2147483676"/>
+          </pc:sldLayoutMkLst>
+        </pc:sldLayoutChg>
+        <pc:sldLayoutChg chg="addSp delSp mod">
+          <pc:chgData name="Zachary Ching" userId="e8ded5238a264daa" providerId="LiveId" clId="{3D448EFD-A4FA-4309-B275-76E7422B54C0}" dt="2022-09-28T15:42:55.065" v="493" actId="478"/>
+          <pc:sldLayoutMkLst>
+            <pc:docMk/>
+            <pc:sldMasterMk cId="124448909" sldId="2147483685"/>
+            <pc:sldLayoutMk cId="3308255150" sldId="2147483684"/>
+          </pc:sldLayoutMkLst>
+          <pc:spChg chg="del topLvl">
+            <ac:chgData name="Zachary Ching" userId="e8ded5238a264daa" providerId="LiveId" clId="{3D448EFD-A4FA-4309-B275-76E7422B54C0}" dt="2022-09-28T15:42:55.065" v="493" actId="478"/>
+            <ac:spMkLst>
+              <pc:docMk/>
+              <pc:sldMasterMk cId="124448909" sldId="2147483685"/>
+              <pc:sldLayoutMk cId="3308255150" sldId="2147483684"/>
+              <ac:spMk id="15" creationId="{2D2224CB-5DFF-3D4B-816B-1A44228A23EE}"/>
+            </ac:spMkLst>
+          </pc:spChg>
+          <pc:grpChg chg="add del">
+            <ac:chgData name="Zachary Ching" userId="e8ded5238a264daa" providerId="LiveId" clId="{3D448EFD-A4FA-4309-B275-76E7422B54C0}" dt="2022-09-28T15:42:55.065" v="493" actId="478"/>
+            <ac:grpSpMkLst>
+              <pc:docMk/>
+              <pc:sldMasterMk cId="124448909" sldId="2147483685"/>
+              <pc:sldLayoutMk cId="3308255150" sldId="2147483684"/>
+              <ac:grpSpMk id="13" creationId="{7D914FC0-3771-6041-9E7C-1C624C85A803}"/>
+            </ac:grpSpMkLst>
+          </pc:grpChg>
+          <pc:cxnChg chg="topLvl">
+            <ac:chgData name="Zachary Ching" userId="e8ded5238a264daa" providerId="LiveId" clId="{3D448EFD-A4FA-4309-B275-76E7422B54C0}" dt="2022-09-28T15:42:55.065" v="493" actId="478"/>
+            <ac:cxnSpMkLst>
+              <pc:docMk/>
+              <pc:sldMasterMk cId="124448909" sldId="2147483685"/>
+              <pc:sldLayoutMk cId="3308255150" sldId="2147483684"/>
+              <ac:cxnSpMk id="14" creationId="{0AED3128-974C-7F4B-BF36-A3836D1725F6}"/>
+            </ac:cxnSpMkLst>
+          </pc:cxnChg>
+        </pc:sldLayoutChg>
+        <pc:sldLayoutChg chg="del">
+          <pc:chgData name="Zachary Ching" userId="e8ded5238a264daa" providerId="LiveId" clId="{3D448EFD-A4FA-4309-B275-76E7422B54C0}" dt="2022-09-28T15:19:25.001" v="67" actId="47"/>
+          <pc:sldLayoutMkLst>
+            <pc:docMk/>
+            <pc:sldMasterMk cId="124448909" sldId="2147483685"/>
+            <pc:sldLayoutMk cId="45627368" sldId="2147483686"/>
+          </pc:sldLayoutMkLst>
+        </pc:sldLayoutChg>
+        <pc:sldLayoutChg chg="delSp mod">
+          <pc:chgData name="Zachary Ching" userId="e8ded5238a264daa" providerId="LiveId" clId="{3D448EFD-A4FA-4309-B275-76E7422B54C0}" dt="2022-09-28T15:18:37.961" v="62" actId="478"/>
+          <pc:sldLayoutMkLst>
+            <pc:docMk/>
+            <pc:sldMasterMk cId="124448909" sldId="2147483685"/>
+            <pc:sldLayoutMk cId="195263233" sldId="2147483692"/>
+          </pc:sldLayoutMkLst>
+          <pc:spChg chg="del">
+            <ac:chgData name="Zachary Ching" userId="e8ded5238a264daa" providerId="LiveId" clId="{3D448EFD-A4FA-4309-B275-76E7422B54C0}" dt="2022-09-28T15:18:37.961" v="62" actId="478"/>
+            <ac:spMkLst>
+              <pc:docMk/>
+              <pc:sldMasterMk cId="124448909" sldId="2147483685"/>
+              <pc:sldLayoutMk cId="195263233" sldId="2147483692"/>
+              <ac:spMk id="6" creationId="{7047AEE3-4D24-FE4F-BC8C-1050F33A970F}"/>
+            </ac:spMkLst>
+          </pc:spChg>
+        </pc:sldLayoutChg>
+        <pc:sldLayoutChg chg="del">
+          <pc:chgData name="Zachary Ching" userId="e8ded5238a264daa" providerId="LiveId" clId="{3D448EFD-A4FA-4309-B275-76E7422B54C0}" dt="2022-09-28T15:39:14.133" v="430" actId="2696"/>
+          <pc:sldLayoutMkLst>
+            <pc:docMk/>
+            <pc:sldMasterMk cId="124448909" sldId="2147483685"/>
+            <pc:sldLayoutMk cId="3911834053" sldId="2147483695"/>
+          </pc:sldLayoutMkLst>
+        </pc:sldLayoutChg>
+        <pc:sldLayoutChg chg="delSp mod">
+          <pc:chgData name="Zachary Ching" userId="e8ded5238a264daa" providerId="LiveId" clId="{3D448EFD-A4FA-4309-B275-76E7422B54C0}" dt="2022-09-28T15:18:03.879" v="60" actId="478"/>
+          <pc:sldLayoutMkLst>
+            <pc:docMk/>
+            <pc:sldMasterMk cId="124448909" sldId="2147483685"/>
+            <pc:sldLayoutMk cId="2926791377" sldId="2147483696"/>
+          </pc:sldLayoutMkLst>
+          <pc:spChg chg="del">
+            <ac:chgData name="Zachary Ching" userId="e8ded5238a264daa" providerId="LiveId" clId="{3D448EFD-A4FA-4309-B275-76E7422B54C0}" dt="2022-09-28T15:18:03.879" v="60" actId="478"/>
+            <ac:spMkLst>
+              <pc:docMk/>
+              <pc:sldMasterMk cId="124448909" sldId="2147483685"/>
+              <pc:sldLayoutMk cId="2926791377" sldId="2147483696"/>
+              <ac:spMk id="12" creationId="{BCFE255A-D792-824C-B7BD-0F53CCBE9393}"/>
+            </ac:spMkLst>
+          </pc:spChg>
+          <pc:spChg chg="del">
+            <ac:chgData name="Zachary Ching" userId="e8ded5238a264daa" providerId="LiveId" clId="{3D448EFD-A4FA-4309-B275-76E7422B54C0}" dt="2022-09-28T15:18:03.072" v="59" actId="478"/>
+            <ac:spMkLst>
+              <pc:docMk/>
+              <pc:sldMasterMk cId="124448909" sldId="2147483685"/>
+              <pc:sldLayoutMk cId="2926791377" sldId="2147483696"/>
+              <ac:spMk id="13" creationId="{C5F7BCC5-255A-E040-9CB6-55FC42CEBF16}"/>
+            </ac:spMkLst>
+          </pc:spChg>
+        </pc:sldLayoutChg>
+        <pc:sldLayoutChg chg="addSp delSp mod">
+          <pc:chgData name="Zachary Ching" userId="e8ded5238a264daa" providerId="LiveId" clId="{3D448EFD-A4FA-4309-B275-76E7422B54C0}" dt="2022-09-28T15:43:40.360" v="503" actId="478"/>
+          <pc:sldLayoutMkLst>
+            <pc:docMk/>
+            <pc:sldMasterMk cId="124448909" sldId="2147483685"/>
+            <pc:sldLayoutMk cId="371828364" sldId="2147483698"/>
+          </pc:sldLayoutMkLst>
+          <pc:spChg chg="add del">
+            <ac:chgData name="Zachary Ching" userId="e8ded5238a264daa" providerId="LiveId" clId="{3D448EFD-A4FA-4309-B275-76E7422B54C0}" dt="2022-09-28T15:43:40.360" v="503" actId="478"/>
+            <ac:spMkLst>
+              <pc:docMk/>
+              <pc:sldMasterMk cId="124448909" sldId="2147483685"/>
+              <pc:sldLayoutMk cId="371828364" sldId="2147483698"/>
+              <ac:spMk id="10" creationId="{9EEDEA7C-D9D3-5E4A-A0E6-B7A0ED5E0F89}"/>
+            </ac:spMkLst>
+          </pc:spChg>
+          <pc:spChg chg="del">
+            <ac:chgData name="Zachary Ching" userId="e8ded5238a264daa" providerId="LiveId" clId="{3D448EFD-A4FA-4309-B275-76E7422B54C0}" dt="2022-09-28T15:41:44.364" v="480" actId="478"/>
+            <ac:spMkLst>
+              <pc:docMk/>
+              <pc:sldMasterMk cId="124448909" sldId="2147483685"/>
+              <pc:sldLayoutMk cId="371828364" sldId="2147483698"/>
+              <ac:spMk id="12" creationId="{EF358276-528D-1F4E-804A-4F9FDE93568A}"/>
+            </ac:spMkLst>
+          </pc:spChg>
+          <pc:spChg chg="del">
+            <ac:chgData name="Zachary Ching" userId="e8ded5238a264daa" providerId="LiveId" clId="{3D448EFD-A4FA-4309-B275-76E7422B54C0}" dt="2022-09-28T15:43:14.417" v="495" actId="478"/>
+            <ac:spMkLst>
+              <pc:docMk/>
+              <pc:sldMasterMk cId="124448909" sldId="2147483685"/>
+              <pc:sldLayoutMk cId="371828364" sldId="2147483698"/>
+              <ac:spMk id="15" creationId="{A6817E56-9BF4-B245-9536-10F7E163D7D9}"/>
+            </ac:spMkLst>
+          </pc:spChg>
+        </pc:sldLayoutChg>
+      </pc:sldMasterChg>
+      <pc:sldMasterChg chg="new del mod addSldLayout delSldLayout">
+        <pc:chgData name="Zachary Ching" userId="e8ded5238a264daa" providerId="LiveId" clId="{3D448EFD-A4FA-4309-B275-76E7422B54C0}" dt="2022-09-28T15:43:47.529" v="507" actId="6938"/>
+        <pc:sldMasterMkLst>
+          <pc:docMk/>
+          <pc:sldMasterMk cId="2816664190" sldId="2147483699"/>
+        </pc:sldMasterMkLst>
+        <pc:sldLayoutChg chg="new del replId">
+          <pc:chgData name="Zachary Ching" userId="e8ded5238a264daa" providerId="LiveId" clId="{3D448EFD-A4FA-4309-B275-76E7422B54C0}" dt="2022-09-28T15:43:47.529" v="507" actId="6938"/>
+          <pc:sldLayoutMkLst>
+            <pc:docMk/>
+            <pc:sldMasterMk cId="2816664190" sldId="2147483699"/>
+            <pc:sldLayoutMk cId="969262919" sldId="2147483700"/>
+          </pc:sldLayoutMkLst>
+        </pc:sldLayoutChg>
+        <pc:sldLayoutChg chg="new del replId">
+          <pc:chgData name="Zachary Ching" userId="e8ded5238a264daa" providerId="LiveId" clId="{3D448EFD-A4FA-4309-B275-76E7422B54C0}" dt="2022-09-28T15:43:47.529" v="507" actId="6938"/>
+          <pc:sldLayoutMkLst>
+            <pc:docMk/>
+            <pc:sldMasterMk cId="2816664190" sldId="2147483699"/>
+            <pc:sldLayoutMk cId="236775431" sldId="2147483701"/>
+          </pc:sldLayoutMkLst>
+        </pc:sldLayoutChg>
+        <pc:sldLayoutChg chg="new del replId">
+          <pc:chgData name="Zachary Ching" userId="e8ded5238a264daa" providerId="LiveId" clId="{3D448EFD-A4FA-4309-B275-76E7422B54C0}" dt="2022-09-28T15:43:47.529" v="507" actId="6938"/>
+          <pc:sldLayoutMkLst>
+            <pc:docMk/>
+            <pc:sldMasterMk cId="2816664190" sldId="2147483699"/>
+            <pc:sldLayoutMk cId="1986150910" sldId="2147483702"/>
+          </pc:sldLayoutMkLst>
+        </pc:sldLayoutChg>
+        <pc:sldLayoutChg chg="new del replId">
+          <pc:chgData name="Zachary Ching" userId="e8ded5238a264daa" providerId="LiveId" clId="{3D448EFD-A4FA-4309-B275-76E7422B54C0}" dt="2022-09-28T15:43:47.529" v="507" actId="6938"/>
+          <pc:sldLayoutMkLst>
+            <pc:docMk/>
+            <pc:sldMasterMk cId="2816664190" sldId="2147483699"/>
+            <pc:sldLayoutMk cId="2604056371" sldId="2147483703"/>
+          </pc:sldLayoutMkLst>
+        </pc:sldLayoutChg>
+        <pc:sldLayoutChg chg="new del replId">
+          <pc:chgData name="Zachary Ching" userId="e8ded5238a264daa" providerId="LiveId" clId="{3D448EFD-A4FA-4309-B275-76E7422B54C0}" dt="2022-09-28T15:43:47.529" v="507" actId="6938"/>
+          <pc:sldLayoutMkLst>
+            <pc:docMk/>
+            <pc:sldMasterMk cId="2816664190" sldId="2147483699"/>
+            <pc:sldLayoutMk cId="1532217155" sldId="2147483704"/>
+          </pc:sldLayoutMkLst>
+        </pc:sldLayoutChg>
+        <pc:sldLayoutChg chg="new del replId">
+          <pc:chgData name="Zachary Ching" userId="e8ded5238a264daa" providerId="LiveId" clId="{3D448EFD-A4FA-4309-B275-76E7422B54C0}" dt="2022-09-28T15:43:47.529" v="507" actId="6938"/>
+          <pc:sldLayoutMkLst>
+            <pc:docMk/>
+            <pc:sldMasterMk cId="2816664190" sldId="2147483699"/>
+            <pc:sldLayoutMk cId="3787248817" sldId="2147483705"/>
+          </pc:sldLayoutMkLst>
+        </pc:sldLayoutChg>
+        <pc:sldLayoutChg chg="new del replId">
+          <pc:chgData name="Zachary Ching" userId="e8ded5238a264daa" providerId="LiveId" clId="{3D448EFD-A4FA-4309-B275-76E7422B54C0}" dt="2022-09-28T15:43:47.529" v="507" actId="6938"/>
+          <pc:sldLayoutMkLst>
+            <pc:docMk/>
+            <pc:sldMasterMk cId="2816664190" sldId="2147483699"/>
+            <pc:sldLayoutMk cId="2202763947" sldId="2147483706"/>
+          </pc:sldLayoutMkLst>
+        </pc:sldLayoutChg>
+        <pc:sldLayoutChg chg="new del replId">
+          <pc:chgData name="Zachary Ching" userId="e8ded5238a264daa" providerId="LiveId" clId="{3D448EFD-A4FA-4309-B275-76E7422B54C0}" dt="2022-09-28T15:43:47.529" v="507" actId="6938"/>
+          <pc:sldLayoutMkLst>
+            <pc:docMk/>
+            <pc:sldMasterMk cId="2816664190" sldId="2147483699"/>
+            <pc:sldLayoutMk cId="1653408543" sldId="2147483707"/>
+          </pc:sldLayoutMkLst>
+        </pc:sldLayoutChg>
+        <pc:sldLayoutChg chg="new del replId">
+          <pc:chgData name="Zachary Ching" userId="e8ded5238a264daa" providerId="LiveId" clId="{3D448EFD-A4FA-4309-B275-76E7422B54C0}" dt="2022-09-28T15:43:47.529" v="507" actId="6938"/>
+          <pc:sldLayoutMkLst>
+            <pc:docMk/>
+            <pc:sldMasterMk cId="2816664190" sldId="2147483699"/>
+            <pc:sldLayoutMk cId="3613053189" sldId="2147483708"/>
+          </pc:sldLayoutMkLst>
+        </pc:sldLayoutChg>
+        <pc:sldLayoutChg chg="new del replId">
+          <pc:chgData name="Zachary Ching" userId="e8ded5238a264daa" providerId="LiveId" clId="{3D448EFD-A4FA-4309-B275-76E7422B54C0}" dt="2022-09-28T15:43:47.529" v="507" actId="6938"/>
+          <pc:sldLayoutMkLst>
+            <pc:docMk/>
+            <pc:sldMasterMk cId="2816664190" sldId="2147483699"/>
+            <pc:sldLayoutMk cId="3265012340" sldId="2147483709"/>
+          </pc:sldLayoutMkLst>
+        </pc:sldLayoutChg>
+        <pc:sldLayoutChg chg="new del replId">
+          <pc:chgData name="Zachary Ching" userId="e8ded5238a264daa" providerId="LiveId" clId="{3D448EFD-A4FA-4309-B275-76E7422B54C0}" dt="2022-09-28T15:43:47.529" v="507" actId="6938"/>
+          <pc:sldLayoutMkLst>
+            <pc:docMk/>
+            <pc:sldMasterMk cId="2816664190" sldId="2147483699"/>
+            <pc:sldLayoutMk cId="2813068730" sldId="2147483710"/>
+          </pc:sldLayoutMkLst>
+        </pc:sldLayoutChg>
+      </pc:sldMasterChg>
+      <pc:sldMasterChg chg="new del mod addSldLayout delSldLayout">
+        <pc:chgData name="Zachary Ching" userId="e8ded5238a264daa" providerId="LiveId" clId="{3D448EFD-A4FA-4309-B275-76E7422B54C0}" dt="2022-09-28T15:43:46.863" v="506" actId="6938"/>
+        <pc:sldMasterMkLst>
+          <pc:docMk/>
+          <pc:sldMasterMk cId="270524473" sldId="2147483711"/>
+        </pc:sldMasterMkLst>
+        <pc:sldLayoutChg chg="new del replId">
+          <pc:chgData name="Zachary Ching" userId="e8ded5238a264daa" providerId="LiveId" clId="{3D448EFD-A4FA-4309-B275-76E7422B54C0}" dt="2022-09-28T15:43:46.863" v="506" actId="6938"/>
+          <pc:sldLayoutMkLst>
+            <pc:docMk/>
+            <pc:sldMasterMk cId="270524473" sldId="2147483711"/>
+            <pc:sldLayoutMk cId="3956329267" sldId="2147483712"/>
+          </pc:sldLayoutMkLst>
+        </pc:sldLayoutChg>
+        <pc:sldLayoutChg chg="new del replId">
+          <pc:chgData name="Zachary Ching" userId="e8ded5238a264daa" providerId="LiveId" clId="{3D448EFD-A4FA-4309-B275-76E7422B54C0}" dt="2022-09-28T15:43:46.863" v="506" actId="6938"/>
+          <pc:sldLayoutMkLst>
+            <pc:docMk/>
+            <pc:sldMasterMk cId="270524473" sldId="2147483711"/>
+            <pc:sldLayoutMk cId="2868743976" sldId="2147483713"/>
+          </pc:sldLayoutMkLst>
+        </pc:sldLayoutChg>
+        <pc:sldLayoutChg chg="new del replId">
+          <pc:chgData name="Zachary Ching" userId="e8ded5238a264daa" providerId="LiveId" clId="{3D448EFD-A4FA-4309-B275-76E7422B54C0}" dt="2022-09-28T15:43:46.863" v="506" actId="6938"/>
+          <pc:sldLayoutMkLst>
+            <pc:docMk/>
+            <pc:sldMasterMk cId="270524473" sldId="2147483711"/>
+            <pc:sldLayoutMk cId="2924100102" sldId="2147483714"/>
+          </pc:sldLayoutMkLst>
+        </pc:sldLayoutChg>
+        <pc:sldLayoutChg chg="new del replId">
+          <pc:chgData name="Zachary Ching" userId="e8ded5238a264daa" providerId="LiveId" clId="{3D448EFD-A4FA-4309-B275-76E7422B54C0}" dt="2022-09-28T15:43:46.863" v="506" actId="6938"/>
+          <pc:sldLayoutMkLst>
+            <pc:docMk/>
+            <pc:sldMasterMk cId="270524473" sldId="2147483711"/>
+            <pc:sldLayoutMk cId="3950144476" sldId="2147483715"/>
+          </pc:sldLayoutMkLst>
+        </pc:sldLayoutChg>
+        <pc:sldLayoutChg chg="new del replId">
+          <pc:chgData name="Zachary Ching" userId="e8ded5238a264daa" providerId="LiveId" clId="{3D448EFD-A4FA-4309-B275-76E7422B54C0}" dt="2022-09-28T15:43:46.863" v="506" actId="6938"/>
+          <pc:sldLayoutMkLst>
+            <pc:docMk/>
+            <pc:sldMasterMk cId="270524473" sldId="2147483711"/>
+            <pc:sldLayoutMk cId="2303378869" sldId="2147483716"/>
+          </pc:sldLayoutMkLst>
+        </pc:sldLayoutChg>
+        <pc:sldLayoutChg chg="new del replId">
+          <pc:chgData name="Zachary Ching" userId="e8ded5238a264daa" providerId="LiveId" clId="{3D448EFD-A4FA-4309-B275-76E7422B54C0}" dt="2022-09-28T15:43:46.863" v="506" actId="6938"/>
+          <pc:sldLayoutMkLst>
+            <pc:docMk/>
+            <pc:sldMasterMk cId="270524473" sldId="2147483711"/>
+            <pc:sldLayoutMk cId="1728876099" sldId="2147483717"/>
+          </pc:sldLayoutMkLst>
+        </pc:sldLayoutChg>
+        <pc:sldLayoutChg chg="new del replId">
+          <pc:chgData name="Zachary Ching" userId="e8ded5238a264daa" providerId="LiveId" clId="{3D448EFD-A4FA-4309-B275-76E7422B54C0}" dt="2022-09-28T15:43:46.863" v="506" actId="6938"/>
+          <pc:sldLayoutMkLst>
+            <pc:docMk/>
+            <pc:sldMasterMk cId="270524473" sldId="2147483711"/>
+            <pc:sldLayoutMk cId="681704927" sldId="2147483718"/>
+          </pc:sldLayoutMkLst>
+        </pc:sldLayoutChg>
+        <pc:sldLayoutChg chg="new del replId">
+          <pc:chgData name="Zachary Ching" userId="e8ded5238a264daa" providerId="LiveId" clId="{3D448EFD-A4FA-4309-B275-76E7422B54C0}" dt="2022-09-28T15:43:46.863" v="506" actId="6938"/>
+          <pc:sldLayoutMkLst>
+            <pc:docMk/>
+            <pc:sldMasterMk cId="270524473" sldId="2147483711"/>
+            <pc:sldLayoutMk cId="2351458490" sldId="2147483719"/>
+          </pc:sldLayoutMkLst>
+        </pc:sldLayoutChg>
+        <pc:sldLayoutChg chg="new del replId">
+          <pc:chgData name="Zachary Ching" userId="e8ded5238a264daa" providerId="LiveId" clId="{3D448EFD-A4FA-4309-B275-76E7422B54C0}" dt="2022-09-28T15:43:46.863" v="506" actId="6938"/>
+          <pc:sldLayoutMkLst>
+            <pc:docMk/>
+            <pc:sldMasterMk cId="270524473" sldId="2147483711"/>
+            <pc:sldLayoutMk cId="1868279056" sldId="2147483720"/>
+          </pc:sldLayoutMkLst>
+        </pc:sldLayoutChg>
+        <pc:sldLayoutChg chg="new del replId">
+          <pc:chgData name="Zachary Ching" userId="e8ded5238a264daa" providerId="LiveId" clId="{3D448EFD-A4FA-4309-B275-76E7422B54C0}" dt="2022-09-28T15:43:46.863" v="506" actId="6938"/>
+          <pc:sldLayoutMkLst>
+            <pc:docMk/>
+            <pc:sldMasterMk cId="270524473" sldId="2147483711"/>
+            <pc:sldLayoutMk cId="4066053142" sldId="2147483721"/>
+          </pc:sldLayoutMkLst>
+        </pc:sldLayoutChg>
+        <pc:sldLayoutChg chg="new del replId">
+          <pc:chgData name="Zachary Ching" userId="e8ded5238a264daa" providerId="LiveId" clId="{3D448EFD-A4FA-4309-B275-76E7422B54C0}" dt="2022-09-28T15:43:46.863" v="506" actId="6938"/>
+          <pc:sldLayoutMkLst>
+            <pc:docMk/>
+            <pc:sldMasterMk cId="270524473" sldId="2147483711"/>
+            <pc:sldLayoutMk cId="4056422058" sldId="2147483722"/>
+          </pc:sldLayoutMkLst>
+        </pc:sldLayoutChg>
+      </pc:sldMasterChg>
+    </pc:docChg>
+  </pc:docChgLst>
+  <pc:docChgLst>
+    <pc:chgData name="Guest User" providerId="Windows Live" clId="Web-{4BB3BBCE-7D95-41F5-BC1E-3ACE61F61D21}"/>
+    <pc:docChg chg="modSld">
+      <pc:chgData name="Guest User" userId="" providerId="Windows Live" clId="Web-{4BB3BBCE-7D95-41F5-BC1E-3ACE61F61D21}" dt="2022-10-03T05:19:01.732" v="15" actId="1076"/>
+      <pc:docMkLst>
+        <pc:docMk/>
+      </pc:docMkLst>
+      <pc:sldChg chg="addSp delSp modSp">
+        <pc:chgData name="Guest User" userId="" providerId="Windows Live" clId="Web-{4BB3BBCE-7D95-41F5-BC1E-3ACE61F61D21}" dt="2022-10-03T05:19:01.732" v="15" actId="1076"/>
+        <pc:sldMkLst>
+          <pc:docMk/>
+          <pc:sldMk cId="2978631845" sldId="357"/>
+        </pc:sldMkLst>
+        <pc:spChg chg="del">
+          <ac:chgData name="Guest User" userId="" providerId="Windows Live" clId="Web-{4BB3BBCE-7D95-41F5-BC1E-3ACE61F61D21}" dt="2022-10-03T05:18:28.419" v="0"/>
+          <ac:spMkLst>
+            <pc:docMk/>
+            <pc:sldMk cId="2978631845" sldId="357"/>
+            <ac:spMk id="3" creationId="{23606CA4-4873-C426-4623-333B12F5AD89}"/>
+          </ac:spMkLst>
+        </pc:spChg>
+        <pc:picChg chg="add mod ord">
+          <ac:chgData name="Guest User" userId="" providerId="Windows Live" clId="Web-{4BB3BBCE-7D95-41F5-BC1E-3ACE61F61D21}" dt="2022-10-03T05:19:01.732" v="15" actId="1076"/>
+          <ac:picMkLst>
+            <pc:docMk/>
+            <pc:sldMk cId="2978631845" sldId="357"/>
+            <ac:picMk id="5" creationId="{39646156-15DA-669D-31CE-7327DACCE356}"/>
+          </ac:picMkLst>
+        </pc:picChg>
+        <pc:picChg chg="add mod">
+          <ac:chgData name="Guest User" userId="" providerId="Windows Live" clId="Web-{4BB3BBCE-7D95-41F5-BC1E-3ACE61F61D21}" dt="2022-10-03T05:18:58.716" v="14" actId="1076"/>
+          <ac:picMkLst>
+            <pc:docMk/>
+            <pc:sldMk cId="2978631845" sldId="357"/>
+            <ac:picMk id="6" creationId="{1AB1F8C5-3B90-68C6-35CA-5880EC182E31}"/>
+          </ac:picMkLst>
+        </pc:picChg>
+      </pc:sldChg>
+    </pc:docChg>
+  </pc:docChgLst>
+  <pc:docChgLst>
+    <pc:chgData name="Luke Osborne" userId="a8ad5f1f86bb4f0c" providerId="LiveId" clId="{D3C24DA6-F030-403C-976E-B7E9E8029620}"/>
+    <pc:docChg chg="undo custSel addSld modSld sldOrd">
+      <pc:chgData name="Luke Osborne" userId="a8ad5f1f86bb4f0c" providerId="LiveId" clId="{D3C24DA6-F030-403C-976E-B7E9E8029620}" dt="2022-09-30T02:14:09.382" v="2115" actId="1035"/>
+      <pc:docMkLst>
+        <pc:docMk/>
+      </pc:docMkLst>
+      <pc:sldChg chg="modSp mod ord">
+        <pc:chgData name="Luke Osborne" userId="a8ad5f1f86bb4f0c" providerId="LiveId" clId="{D3C24DA6-F030-403C-976E-B7E9E8029620}" dt="2022-09-29T16:24:46.121" v="2091"/>
+        <pc:sldMkLst>
+          <pc:docMk/>
+          <pc:sldMk cId="585127906" sldId="263"/>
+        </pc:sldMkLst>
+        <pc:spChg chg="mod">
+          <ac:chgData name="Luke Osborne" userId="a8ad5f1f86bb4f0c" providerId="LiveId" clId="{D3C24DA6-F030-403C-976E-B7E9E8029620}" dt="2022-09-29T15:43:34.798" v="8" actId="20577"/>
+          <ac:spMkLst>
+            <pc:docMk/>
+            <pc:sldMk cId="585127906" sldId="263"/>
+            <ac:spMk id="2" creationId="{6F204F3F-D196-428C-AE74-238938FD8008}"/>
+          </ac:spMkLst>
+        </pc:spChg>
+        <pc:spChg chg="mod">
+          <ac:chgData name="Luke Osborne" userId="a8ad5f1f86bb4f0c" providerId="LiveId" clId="{D3C24DA6-F030-403C-976E-B7E9E8029620}" dt="2022-09-29T16:06:39.407" v="1084" actId="20577"/>
+          <ac:spMkLst>
+            <pc:docMk/>
+            <pc:sldMk cId="585127906" sldId="263"/>
+            <ac:spMk id="26" creationId="{E01CCBC3-476F-DA4C-A883-93E600ECAC2E}"/>
+          </ac:spMkLst>
+        </pc:spChg>
+        <pc:graphicFrameChg chg="mod modGraphic">
+          <ac:chgData name="Luke Osborne" userId="a8ad5f1f86bb4f0c" providerId="LiveId" clId="{D3C24DA6-F030-403C-976E-B7E9E8029620}" dt="2022-09-29T15:58:12.152" v="661" actId="1076"/>
+          <ac:graphicFrameMkLst>
+            <pc:docMk/>
+            <pc:sldMk cId="585127906" sldId="263"/>
+            <ac:graphicFrameMk id="21" creationId="{4E2A0199-4670-2940-AB7E-F5CEB06DD52C}"/>
+          </ac:graphicFrameMkLst>
+        </pc:graphicFrameChg>
+      </pc:sldChg>
+      <pc:sldChg chg="addSp delSp modSp add mod ord">
+        <pc:chgData name="Luke Osborne" userId="a8ad5f1f86bb4f0c" providerId="LiveId" clId="{D3C24DA6-F030-403C-976E-B7E9E8029620}" dt="2022-09-29T16:40:49.753" v="2092" actId="20577"/>
+        <pc:sldMkLst>
+          <pc:docMk/>
+          <pc:sldMk cId="2913579532" sldId="354"/>
+        </pc:sldMkLst>
+        <pc:spChg chg="mod">
+          <ac:chgData name="Luke Osborne" userId="a8ad5f1f86bb4f0c" providerId="LiveId" clId="{D3C24DA6-F030-403C-976E-B7E9E8029620}" dt="2022-09-29T16:09:10.027" v="1137" actId="20577"/>
+          <ac:spMkLst>
+            <pc:docMk/>
+            <pc:sldMk cId="2913579532" sldId="354"/>
+            <ac:spMk id="2" creationId="{6F204F3F-D196-428C-AE74-238938FD8008}"/>
+          </ac:spMkLst>
+        </pc:spChg>
+        <pc:spChg chg="add del mod">
+          <ac:chgData name="Luke Osborne" userId="a8ad5f1f86bb4f0c" providerId="LiveId" clId="{D3C24DA6-F030-403C-976E-B7E9E8029620}" dt="2022-09-29T16:11:15.419" v="1139" actId="478"/>
+          <ac:spMkLst>
+            <pc:docMk/>
+            <pc:sldMk cId="2913579532" sldId="354"/>
+            <ac:spMk id="4" creationId="{7417845E-AA0C-C09B-357C-29370AFC4A5A}"/>
+          </ac:spMkLst>
+        </pc:spChg>
+        <pc:spChg chg="add del mod">
+          <ac:chgData name="Luke Osborne" userId="a8ad5f1f86bb4f0c" providerId="LiveId" clId="{D3C24DA6-F030-403C-976E-B7E9E8029620}" dt="2022-09-29T16:21:04.698" v="1567" actId="478"/>
+          <ac:spMkLst>
+            <pc:docMk/>
+            <pc:sldMk cId="2913579532" sldId="354"/>
+            <ac:spMk id="7" creationId="{7271DFDD-BE82-E791-89DB-A9DE285A6657}"/>
+          </ac:spMkLst>
+        </pc:spChg>
+        <pc:spChg chg="mod">
+          <ac:chgData name="Luke Osborne" userId="a8ad5f1f86bb4f0c" providerId="LiveId" clId="{D3C24DA6-F030-403C-976E-B7E9E8029620}" dt="2022-09-29T16:40:49.753" v="2092" actId="20577"/>
+          <ac:spMkLst>
+            <pc:docMk/>
+            <pc:sldMk cId="2913579532" sldId="354"/>
+            <ac:spMk id="26" creationId="{E01CCBC3-476F-DA4C-A883-93E600ECAC2E}"/>
+          </ac:spMkLst>
+        </pc:spChg>
+        <pc:graphicFrameChg chg="del">
+          <ac:chgData name="Luke Osborne" userId="a8ad5f1f86bb4f0c" providerId="LiveId" clId="{D3C24DA6-F030-403C-976E-B7E9E8029620}" dt="2022-09-29T16:11:13.575" v="1138" actId="478"/>
+          <ac:graphicFrameMkLst>
+            <pc:docMk/>
+            <pc:sldMk cId="2913579532" sldId="354"/>
+            <ac:graphicFrameMk id="21" creationId="{4E2A0199-4670-2940-AB7E-F5CEB06DD52C}"/>
+          </ac:graphicFrameMkLst>
+        </pc:graphicFrameChg>
+        <pc:picChg chg="add mod modCrop">
+          <ac:chgData name="Luke Osborne" userId="a8ad5f1f86bb4f0c" providerId="LiveId" clId="{D3C24DA6-F030-403C-976E-B7E9E8029620}" dt="2022-09-29T16:22:21.418" v="1823" actId="1076"/>
+          <ac:picMkLst>
+            <pc:docMk/>
+            <pc:sldMk cId="2913579532" sldId="354"/>
+            <ac:picMk id="6" creationId="{ABB131C7-2DDC-359F-0549-1C9A2B752AE4}"/>
+          </ac:picMkLst>
+        </pc:picChg>
+      </pc:sldChg>
+      <pc:sldChg chg="addSp delSp modSp add mod">
+        <pc:chgData name="Luke Osborne" userId="a8ad5f1f86bb4f0c" providerId="LiveId" clId="{D3C24DA6-F030-403C-976E-B7E9E8029620}" dt="2022-09-29T16:16:21.582" v="1257" actId="1076"/>
+        <pc:sldMkLst>
+          <pc:docMk/>
+          <pc:sldMk cId="4007609370" sldId="355"/>
+        </pc:sldMkLst>
+        <pc:spChg chg="add del mod">
+          <ac:chgData name="Luke Osborne" userId="a8ad5f1f86bb4f0c" providerId="LiveId" clId="{D3C24DA6-F030-403C-976E-B7E9E8029620}" dt="2022-09-29T16:11:54.155" v="1150" actId="478"/>
+          <ac:spMkLst>
+            <pc:docMk/>
+            <pc:sldMk cId="4007609370" sldId="355"/>
+            <ac:spMk id="4" creationId="{8854E78F-740A-5F14-C7E1-D63C2B4276F6}"/>
+          </ac:spMkLst>
+        </pc:spChg>
+        <pc:spChg chg="add mod">
+          <ac:chgData name="Luke Osborne" userId="a8ad5f1f86bb4f0c" providerId="LiveId" clId="{D3C24DA6-F030-403C-976E-B7E9E8029620}" dt="2022-09-29T16:15:52.175" v="1224" actId="1076"/>
+          <ac:spMkLst>
+            <pc:docMk/>
+            <pc:sldMk cId="4007609370" sldId="355"/>
+            <ac:spMk id="9" creationId="{B61D052C-98D6-CBDF-0ED0-C623292ABA6F}"/>
+          </ac:spMkLst>
+        </pc:spChg>
+        <pc:spChg chg="add mod">
+          <ac:chgData name="Luke Osborne" userId="a8ad5f1f86bb4f0c" providerId="LiveId" clId="{D3C24DA6-F030-403C-976E-B7E9E8029620}" dt="2022-09-29T16:16:21.582" v="1257" actId="1076"/>
+          <ac:spMkLst>
+            <pc:docMk/>
+            <pc:sldMk cId="4007609370" sldId="355"/>
+            <ac:spMk id="10" creationId="{217A0562-F59C-7A5A-394B-59BFA0CFFC7D}"/>
+          </ac:spMkLst>
+        </pc:spChg>
+        <pc:spChg chg="del">
+          <ac:chgData name="Luke Osborne" userId="a8ad5f1f86bb4f0c" providerId="LiveId" clId="{D3C24DA6-F030-403C-976E-B7E9E8029620}" dt="2022-09-29T16:11:52.109" v="1149" actId="478"/>
+          <ac:spMkLst>
+            <pc:docMk/>
+            <pc:sldMk cId="4007609370" sldId="355"/>
+            <ac:spMk id="26" creationId="{E01CCBC3-476F-DA4C-A883-93E600ECAC2E}"/>
+          </ac:spMkLst>
+        </pc:spChg>
+        <pc:picChg chg="add del mod">
+          <ac:chgData name="Luke Osborne" userId="a8ad5f1f86bb4f0c" providerId="LiveId" clId="{D3C24DA6-F030-403C-976E-B7E9E8029620}" dt="2022-09-29T16:12:02.935" v="1155" actId="478"/>
+          <ac:picMkLst>
+            <pc:docMk/>
+            <pc:sldMk cId="4007609370" sldId="355"/>
+            <ac:picMk id="5" creationId="{918DA6F6-75AC-0C48-B00D-C4AC68A49374}"/>
+          </ac:picMkLst>
+        </pc:picChg>
+        <pc:picChg chg="mod modCrop">
+          <ac:chgData name="Luke Osborne" userId="a8ad5f1f86bb4f0c" providerId="LiveId" clId="{D3C24DA6-F030-403C-976E-B7E9E8029620}" dt="2022-09-29T16:15:22.647" v="1195" actId="1076"/>
+          <ac:picMkLst>
+            <pc:docMk/>
+            <pc:sldMk cId="4007609370" sldId="355"/>
+            <ac:picMk id="6" creationId="{ABB131C7-2DDC-359F-0549-1C9A2B752AE4}"/>
+          </ac:picMkLst>
+        </pc:picChg>
+        <pc:picChg chg="add mod modCrop">
+          <ac:chgData name="Luke Osborne" userId="a8ad5f1f86bb4f0c" providerId="LiveId" clId="{D3C24DA6-F030-403C-976E-B7E9E8029620}" dt="2022-09-29T16:14:26.224" v="1186" actId="18131"/>
+          <ac:picMkLst>
+            <pc:docMk/>
+            <pc:sldMk cId="4007609370" sldId="355"/>
+            <ac:picMk id="8" creationId="{7D1E561D-FF3F-A891-FC4B-5F99F463FBD9}"/>
+          </ac:picMkLst>
+        </pc:picChg>
+      </pc:sldChg>
+      <pc:sldChg chg="addSp delSp modSp add mod">
+        <pc:chgData name="Luke Osborne" userId="a8ad5f1f86bb4f0c" providerId="LiveId" clId="{D3C24DA6-F030-403C-976E-B7E9E8029620}" dt="2022-09-30T02:14:09.382" v="2115" actId="1035"/>
+        <pc:sldMkLst>
+          <pc:docMk/>
+          <pc:sldMk cId="1277554913" sldId="359"/>
+        </pc:sldMkLst>
+        <pc:spChg chg="add del mod">
+          <ac:chgData name="Luke Osborne" userId="a8ad5f1f86bb4f0c" providerId="LiveId" clId="{D3C24DA6-F030-403C-976E-B7E9E8029620}" dt="2022-09-30T02:10:28.326" v="2096" actId="478"/>
+          <ac:spMkLst>
+            <pc:docMk/>
+            <pc:sldMk cId="1277554913" sldId="359"/>
+            <ac:spMk id="4" creationId="{ABBC7DEE-0283-1FC8-4E5B-8E7E356D2532}"/>
+          </ac:spMkLst>
+        </pc:spChg>
+        <pc:spChg chg="add del mod">
+          <ac:chgData name="Luke Osborne" userId="a8ad5f1f86bb4f0c" providerId="LiveId" clId="{D3C24DA6-F030-403C-976E-B7E9E8029620}" dt="2022-09-30T02:11:14.037" v="2106" actId="478"/>
+          <ac:spMkLst>
+            <pc:docMk/>
+            <pc:sldMk cId="1277554913" sldId="359"/>
+            <ac:spMk id="6" creationId="{78667095-1403-F301-C4F4-7F69DE5D5BFB}"/>
+          </ac:spMkLst>
+        </pc:spChg>
+        <pc:spChg chg="del">
+          <ac:chgData name="Luke Osborne" userId="a8ad5f1f86bb4f0c" providerId="LiveId" clId="{D3C24DA6-F030-403C-976E-B7E9E8029620}" dt="2022-09-30T02:10:25.621" v="2094" actId="478"/>
+          <ac:spMkLst>
+            <pc:docMk/>
+            <pc:sldMk cId="1277554913" sldId="359"/>
+            <ac:spMk id="26" creationId="{E01CCBC3-476F-DA4C-A883-93E600ECAC2E}"/>
+          </ac:spMkLst>
+        </pc:spChg>
+        <pc:graphicFrameChg chg="del">
+          <ac:chgData name="Luke Osborne" userId="a8ad5f1f86bb4f0c" providerId="LiveId" clId="{D3C24DA6-F030-403C-976E-B7E9E8029620}" dt="2022-09-30T02:10:27.031" v="2095" actId="478"/>
+          <ac:graphicFrameMkLst>
+            <pc:docMk/>
+            <pc:sldMk cId="1277554913" sldId="359"/>
+            <ac:graphicFrameMk id="21" creationId="{4E2A0199-4670-2940-AB7E-F5CEB06DD52C}"/>
+          </ac:graphicFrameMkLst>
+        </pc:graphicFrameChg>
+        <pc:picChg chg="add mod">
+          <ac:chgData name="Luke Osborne" userId="a8ad5f1f86bb4f0c" providerId="LiveId" clId="{D3C24DA6-F030-403C-976E-B7E9E8029620}" dt="2022-09-30T02:14:09.382" v="2115" actId="1035"/>
+          <ac:picMkLst>
+            <pc:docMk/>
+            <pc:sldMk cId="1277554913" sldId="359"/>
+            <ac:picMk id="1026" creationId="{1E6BAC3F-814B-F755-8F0D-E429955331D3}"/>
+          </ac:picMkLst>
+        </pc:picChg>
+      </pc:sldChg>
+    </pc:docChg>
+  </pc:docChgLst>
+</pc:chgInfo>
 </file>
 
 <file path=ppt/handoutMasters/handoutMaster1.xml><?xml version="1.0" encoding="utf-8"?>
@@ -6869,132 +8321,6 @@
           <p:cNvPr id="2" name="Content Placeholder 1">
             <a:extLst>
               <a:ext uri="{FF2B5EF4-FFF2-40B4-BE49-F238E27FC236}">
-                <a16:creationId xmlns:a16="http://schemas.microsoft.com/office/drawing/2014/main" id="{10FC207A-EFFB-297D-1550-C8A5AC06687B}"/>
-              </a:ext>
-            </a:extLst>
-          </p:cNvPr>
-          <p:cNvSpPr>
-            <a:spLocks noGrp="1"/>
-          </p:cNvSpPr>
-          <p:nvPr>
-            <p:ph sz="half" idx="1"/>
-          </p:nvPr>
-        </p:nvSpPr>
-        <p:spPr/>
-        <p:txBody>
-          <a:bodyPr/>
-          <a:lstStyle/>
-          <a:p>
-            <a:r>
-              <a:rPr lang="en-AU"/>
-              <a:t>As expected, Range Trading does not trade as long of a duration as Bollinger Bands.</a:t>
-            </a:r>
-          </a:p>
-          <a:p>
-            <a:r>
-              <a:rPr lang="en-AU"/>
-              <a:t>This comes down to the fact that markets are not always trading horizontally.</a:t>
-            </a:r>
-          </a:p>
-          <a:p>
-            <a:r>
-              <a:rPr lang="en-AU"/>
-              <a:t>As such, our Bollinger Bands Algorithm outperformed across the trialled data periods.</a:t>
-            </a:r>
-          </a:p>
-          <a:p>
-            <a:endParaRPr lang="en-AU"/>
-          </a:p>
-        </p:txBody>
-      </p:sp>
-      <p:sp>
-        <p:nvSpPr>
-          <p:cNvPr id="3" name="Content Placeholder 2">
-            <a:extLst>
-              <a:ext uri="{FF2B5EF4-FFF2-40B4-BE49-F238E27FC236}">
-                <a16:creationId xmlns:a16="http://schemas.microsoft.com/office/drawing/2014/main" id="{B5A1EF5E-F590-6C84-69E5-E69E75ED8B7F}"/>
-              </a:ext>
-            </a:extLst>
-          </p:cNvPr>
-          <p:cNvSpPr>
-            <a:spLocks noGrp="1"/>
-          </p:cNvSpPr>
-          <p:nvPr>
-            <p:ph sz="half" idx="2"/>
-          </p:nvPr>
-        </p:nvSpPr>
-        <p:spPr/>
-        <p:txBody>
-          <a:bodyPr/>
-          <a:lstStyle/>
-          <a:p>
-            <a:endParaRPr lang="en-AU"/>
-          </a:p>
-        </p:txBody>
-      </p:sp>
-      <p:sp>
-        <p:nvSpPr>
-          <p:cNvPr id="4" name="Title 3">
-            <a:extLst>
-              <a:ext uri="{FF2B5EF4-FFF2-40B4-BE49-F238E27FC236}">
-                <a16:creationId xmlns:a16="http://schemas.microsoft.com/office/drawing/2014/main" id="{33F21473-DD52-D1EF-D355-A4B08B6B58D0}"/>
-              </a:ext>
-            </a:extLst>
-          </p:cNvPr>
-          <p:cNvSpPr>
-            <a:spLocks noGrp="1"/>
-          </p:cNvSpPr>
-          <p:nvPr>
-            <p:ph type="title"/>
-          </p:nvPr>
-        </p:nvSpPr>
-        <p:spPr/>
-        <p:txBody>
-          <a:bodyPr/>
-          <a:lstStyle/>
-          <a:p>
-            <a:r>
-              <a:rPr lang="en-AU"/>
-              <a:t>Algorithm performance</a:t>
-            </a:r>
-          </a:p>
-        </p:txBody>
-      </p:sp>
-    </p:spTree>
-    <p:extLst>
-      <p:ext uri="{BB962C8B-B14F-4D97-AF65-F5344CB8AC3E}">
-        <p14:creationId xmlns:p14="http://schemas.microsoft.com/office/powerpoint/2010/main" val="1691172745"/>
-      </p:ext>
-    </p:extLst>
-  </p:cSld>
-  <p:clrMapOvr>
-    <a:masterClrMapping/>
-  </p:clrMapOvr>
-</p:sld>
-</file>
-
-<file path=ppt/slides/slide11.xml><?xml version="1.0" encoding="utf-8"?>
-<p:sld xmlns:a="http://schemas.openxmlformats.org/drawingml/2006/main" xmlns:r="http://schemas.openxmlformats.org/officeDocument/2006/relationships" xmlns:p="http://schemas.openxmlformats.org/presentationml/2006/main">
-  <p:cSld>
-    <p:spTree>
-      <p:nvGrpSpPr>
-        <p:cNvPr id="1" name=""/>
-        <p:cNvGrpSpPr/>
-        <p:nvPr/>
-      </p:nvGrpSpPr>
-      <p:grpSpPr>
-        <a:xfrm>
-          <a:off x="0" y="0"/>
-          <a:ext cx="0" cy="0"/>
-          <a:chOff x="0" y="0"/>
-          <a:chExt cx="0" cy="0"/>
-        </a:xfrm>
-      </p:grpSpPr>
-      <p:sp>
-        <p:nvSpPr>
-          <p:cNvPr id="2" name="Content Placeholder 1">
-            <a:extLst>
-              <a:ext uri="{FF2B5EF4-FFF2-40B4-BE49-F238E27FC236}">
                 <a16:creationId xmlns:a16="http://schemas.microsoft.com/office/drawing/2014/main" id="{28420556-8254-54BF-0146-EBBA61D90A60}"/>
               </a:ext>
             </a:extLst>
@@ -7012,18 +8338,27 @@
           <a:lstStyle/>
           <a:p>
             <a:r>
-              <a:rPr lang="en-AU"/>
+              <a:rPr lang="en-AU" dirty="0"/>
+              <a:t>Key Strength laid in synergising strengths of difference algorithms.</a:t>
+            </a:r>
+          </a:p>
+          <a:p>
+            <a:r>
+              <a:rPr lang="en-AU" dirty="0"/>
+              <a:t>Bollinger Bands performed better in fluctuating periods and Range Trading performed better horizontal periods.</a:t>
+            </a:r>
+          </a:p>
+          <a:p>
+            <a:r>
+              <a:rPr lang="en-AU" dirty="0"/>
               <a:t>Throughout our development, back-testing was used on high-growth stocks such as AAPL and TSLA across 2020 with 1 minute and 15 minute intervals.</a:t>
             </a:r>
           </a:p>
           <a:p>
-            <a:r>
-              <a:rPr lang="en-AU"/>
-              <a:t>Final Results of our algorithms showed:</a:t>
-            </a:r>
-          </a:p>
-          <a:p>
-            <a:endParaRPr lang="en-AU"/>
+            <a:pPr marL="0" indent="0">
+              <a:buNone/>
+            </a:pPr>
+            <a:endParaRPr lang="en-AU" dirty="0"/>
           </a:p>
         </p:txBody>
       </p:sp>
@@ -7051,8 +8386,8 @@
         </p:blipFill>
         <p:spPr>
           <a:xfrm>
-            <a:off x="538542" y="3942522"/>
-            <a:ext cx="6198343" cy="2479337"/>
+            <a:off x="5572664" y="4178710"/>
+            <a:ext cx="6198343" cy="2206380"/>
           </a:xfrm>
         </p:spPr>
       </p:pic>
@@ -7106,14 +8441,50 @@
         </p:blipFill>
         <p:spPr>
           <a:xfrm>
-            <a:off x="5572664" y="1428247"/>
-            <a:ext cx="6222520" cy="2477506"/>
+            <a:off x="5572664" y="1983772"/>
+            <a:ext cx="6222520" cy="2206380"/>
           </a:xfrm>
           <a:prstGeom prst="rect">
             <a:avLst/>
           </a:prstGeom>
         </p:spPr>
       </p:pic>
+      <p:sp>
+        <p:nvSpPr>
+          <p:cNvPr id="7" name="TextBox 6">
+            <a:extLst>
+              <a:ext uri="{FF2B5EF4-FFF2-40B4-BE49-F238E27FC236}">
+                <a16:creationId xmlns:a16="http://schemas.microsoft.com/office/drawing/2014/main" id="{5E427509-0E51-698A-CF76-3E630B30592D}"/>
+              </a:ext>
+            </a:extLst>
+          </p:cNvPr>
+          <p:cNvSpPr txBox="1"/>
+          <p:nvPr/>
+        </p:nvSpPr>
+        <p:spPr>
+          <a:xfrm>
+            <a:off x="6982943" y="1587059"/>
+            <a:ext cx="3401961" cy="369332"/>
+          </a:xfrm>
+          <a:prstGeom prst="rect">
+            <a:avLst/>
+          </a:prstGeom>
+          <a:noFill/>
+        </p:spPr>
+        <p:txBody>
+          <a:bodyPr wrap="square" rtlCol="0">
+            <a:spAutoFit/>
+          </a:bodyPr>
+          <a:lstStyle/>
+          <a:p>
+            <a:pPr algn="ctr"/>
+            <a:r>
+              <a:rPr lang="en-AU" dirty="0"/>
+              <a:t>Final Results</a:t>
+            </a:r>
+          </a:p>
+        </p:txBody>
+      </p:sp>
     </p:spTree>
     <p:extLst>
       <p:ext uri="{BB962C8B-B14F-4D97-AF65-F5344CB8AC3E}">
@@ -7127,7 +8498,7 @@
 </p:sld>
 </file>
 
-<file path=ppt/slides/slide12.xml><?xml version="1.0" encoding="utf-8"?>
+<file path=ppt/slides/slide11.xml><?xml version="1.0" encoding="utf-8"?>
 <p:sld xmlns:a="http://schemas.openxmlformats.org/drawingml/2006/main" xmlns:r="http://schemas.openxmlformats.org/officeDocument/2006/relationships" xmlns:p="http://schemas.openxmlformats.org/presentationml/2006/main">
   <p:cSld>
     <p:spTree>
@@ -7442,68 +8813,76 @@
         </p:nvSpPr>
         <p:spPr/>
         <p:txBody>
-          <a:bodyPr/>
+          <a:bodyPr>
+            <a:normAutofit lnSpcReduction="10000"/>
+          </a:bodyPr>
           <a:lstStyle/>
           <a:p>
             <a:pPr marL="0" indent="0">
               <a:buNone/>
             </a:pPr>
             <a:r>
+              <a:rPr lang="en-AU" b="1" dirty="0"/>
+              <a:t>Average True Range</a:t>
+            </a:r>
+          </a:p>
+          <a:p>
+            <a:r>
               <a:rPr lang="en-AU" dirty="0"/>
-              <a:t>Average True Range</a:t>
+              <a:t>Used to view market volatility</a:t>
+            </a:r>
+          </a:p>
+          <a:p>
+            <a:r>
+              <a:rPr lang="en-AU" dirty="0"/>
+              <a:t>Calculated from historical price data</a:t>
             </a:r>
           </a:p>
           <a:p>
             <a:pPr marL="0" indent="0">
               <a:buNone/>
             </a:pPr>
-            <a:endParaRPr lang="en-AU" dirty="0"/>
+            <a:r>
+              <a:rPr lang="en-AU" b="1" dirty="0"/>
+              <a:t>Bollinger Bands</a:t>
+            </a:r>
+          </a:p>
+          <a:p>
+            <a:r>
+              <a:rPr lang="en-AU" dirty="0"/>
+              <a:t>Determine trendlines based on standard deviations from simple moving average price.</a:t>
+            </a:r>
+          </a:p>
+          <a:p>
+            <a:r>
+              <a:rPr lang="en-AU" dirty="0"/>
+              <a:t>Used when security no longer ranges horizontally and capitalises on market fluctuations.</a:t>
+            </a:r>
           </a:p>
           <a:p>
             <a:pPr marL="0" indent="0">
               <a:buNone/>
             </a:pPr>
-            <a:endParaRPr lang="en-AU" dirty="0"/>
-          </a:p>
-          <a:p>
-            <a:pPr marL="0" indent="0">
-              <a:buNone/>
-            </a:pPr>
+            <a:r>
+              <a:rPr lang="en-AU" b="1" dirty="0" err="1"/>
+              <a:t>Donchian</a:t>
+            </a:r>
+            <a:r>
+              <a:rPr lang="en-AU" b="1" dirty="0"/>
+              <a:t> Channels</a:t>
+            </a:r>
+          </a:p>
+          <a:p>
             <a:r>
               <a:rPr lang="en-AU" dirty="0"/>
-              <a:t>Bollinger Bands</a:t>
-            </a:r>
-          </a:p>
-          <a:p>
-            <a:pPr marL="0" indent="0">
-              <a:buNone/>
-            </a:pPr>
-            <a:endParaRPr lang="en-AU" dirty="0"/>
-          </a:p>
-          <a:p>
-            <a:pPr marL="0" indent="0">
-              <a:buNone/>
-            </a:pPr>
-            <a:endParaRPr lang="en-AU" dirty="0"/>
-          </a:p>
-          <a:p>
-            <a:pPr marL="0" indent="0">
-              <a:buNone/>
-            </a:pPr>
-            <a:r>
-              <a:rPr lang="en-AU" dirty="0" err="1"/>
-              <a:t>Donchian</a:t>
-            </a:r>
+              <a:t>Determines bullish and bearish trends</a:t>
+            </a:r>
+          </a:p>
+          <a:p>
             <a:r>
               <a:rPr lang="en-AU" dirty="0"/>
-              <a:t> Channels</a:t>
-            </a:r>
-          </a:p>
-          <a:p>
-            <a:pPr marL="0" indent="0">
-              <a:buNone/>
-            </a:pPr>
-            <a:endParaRPr lang="en-AU" dirty="0"/>
+              <a:t>Determined through highest high and lowest lows within a certain period.</a:t>
+            </a:r>
           </a:p>
           <a:p>
             <a:pPr marL="0" indent="0">
@@ -7535,7 +8914,7 @@
           <a:lstStyle/>
           <a:p>
             <a:r>
-              <a:rPr lang="en-AU"/>
+              <a:rPr lang="en-AU" dirty="0"/>
               <a:t>Range Trading and Technical Indicators</a:t>
             </a:r>
           </a:p>
@@ -9349,46 +10728,55 @@
           <a:lstStyle/>
           <a:p>
             <a:r>
-              <a:rPr lang="en-AU"/>
+              <a:rPr lang="en-AU" dirty="0"/>
               <a:t>Average Directional Index was used to determine when the stocks/markets were not trending and rather, were trading horizontally.</a:t>
             </a:r>
           </a:p>
           <a:p>
             <a:r>
-              <a:rPr lang="en-AU"/>
+              <a:rPr lang="en-AU" dirty="0"/>
               <a:t>In periods of horizontal trading, Ranges were established through finding maximums and minimums of horizontal trading periods and adding a standard deviation buffer.</a:t>
             </a:r>
           </a:p>
           <a:p>
-            <a:endParaRPr lang="en-AU"/>
-          </a:p>
-        </p:txBody>
-      </p:sp>
-      <p:sp>
-        <p:nvSpPr>
-          <p:cNvPr id="3" name="Content Placeholder 2">
+            <a:r>
+              <a:rPr lang="en-AU" dirty="0"/>
+              <a:t>Entry Positions and Stop Losses were identified through determining upper and lower bounds and adding/subtracting a standard deviation.</a:t>
+            </a:r>
+          </a:p>
+          <a:p>
+            <a:endParaRPr lang="en-AU" dirty="0"/>
+          </a:p>
+        </p:txBody>
+      </p:sp>
+      <p:pic>
+        <p:nvPicPr>
+          <p:cNvPr id="12" name="Content Placeholder 11" descr="Chart&#10;&#10;Description automatically generated">
             <a:extLst>
               <a:ext uri="{FF2B5EF4-FFF2-40B4-BE49-F238E27FC236}">
-                <a16:creationId xmlns:a16="http://schemas.microsoft.com/office/drawing/2014/main" id="{22B18F6A-9789-5A5A-39AD-D9F8D0B40CB4}"/>
+                <a16:creationId xmlns:a16="http://schemas.microsoft.com/office/drawing/2014/main" id="{D3AC1957-9275-4A92-CBC7-C0DEFBFF28F4}"/>
               </a:ext>
             </a:extLst>
           </p:cNvPr>
-          <p:cNvSpPr>
-            <a:spLocks noGrp="1"/>
-          </p:cNvSpPr>
+          <p:cNvPicPr>
+            <a:picLocks noGrp="1" noChangeAspect="1"/>
+          </p:cNvPicPr>
           <p:nvPr>
             <p:ph sz="half" idx="2"/>
           </p:nvPr>
-        </p:nvSpPr>
-        <p:spPr/>
-        <p:txBody>
-          <a:bodyPr/>
-          <a:lstStyle/>
-          <a:p>
-            <a:endParaRPr lang="en-AU"/>
-          </a:p>
-        </p:txBody>
-      </p:sp>
+        </p:nvPicPr>
+        <p:blipFill rotWithShape="1">
+          <a:blip r:embed="rId2"/>
+          <a:srcRect b="10927"/>
+          <a:stretch/>
+        </p:blipFill>
+        <p:spPr>
+          <a:xfrm>
+            <a:off x="5053484" y="1956391"/>
+            <a:ext cx="6557322" cy="3638163"/>
+          </a:xfrm>
+        </p:spPr>
+      </p:pic>
       <p:sp>
         <p:nvSpPr>
           <p:cNvPr id="4" name="Title 3">
@@ -10286,6 +11674,15 @@
 </file>
 
 <file path=customXml/item1.xml><?xml version="1.0" encoding="utf-8"?>
+<p:properties xmlns:p="http://schemas.microsoft.com/office/2006/metadata/properties" xmlns:xsi="http://www.w3.org/2001/XMLSchema-instance" xmlns:pc="http://schemas.microsoft.com/office/infopath/2007/PartnerControls">
+  <documentManagement>
+    <Status xmlns="71af3243-3dd4-4a8d-8c0d-dd76da1f02a5">Not started</Status>
+    <MediaServiceKeyPoints xmlns="71af3243-3dd4-4a8d-8c0d-dd76da1f02a5" xsi:nil="true"/>
+  </documentManagement>
+</p:properties>
+</file>
+
+<file path=customXml/item2.xml><?xml version="1.0" encoding="utf-8"?>
 <ct:contentTypeSchema xmlns:ct="http://schemas.microsoft.com/office/2006/metadata/contentType" xmlns:ma="http://schemas.microsoft.com/office/2006/metadata/properties/metaAttributes" ct:_="" ma:_="" ma:contentTypeName="Document" ma:contentTypeID="0x01010079F111ED35F8CC479449609E8A0923A6" ma:contentTypeVersion="12" ma:contentTypeDescription="Create a new document." ma:contentTypeScope="" ma:versionID="b385d60f68dd989dca1fdc827799d853">
   <xsd:schema xmlns:xsd="http://www.w3.org/2001/XMLSchema" xmlns:xs="http://www.w3.org/2001/XMLSchema" xmlns:p="http://schemas.microsoft.com/office/2006/metadata/properties" xmlns:ns2="71af3243-3dd4-4a8d-8c0d-dd76da1f02a5" xmlns:ns3="16c05727-aa75-4e4a-9b5f-8a80a1165891" targetNamespace="http://schemas.microsoft.com/office/2006/metadata/properties" ma:root="true" ma:fieldsID="1911b479caf7b199da365455750e4572" ns2:_="" ns3:_="">
     <xsd:import namespace="71af3243-3dd4-4a8d-8c0d-dd76da1f02a5"/>
@@ -10506,15 +11903,6 @@
 </ct:contentTypeSchema>
 </file>
 
-<file path=customXml/item2.xml><?xml version="1.0" encoding="utf-8"?>
-<p:properties xmlns:p="http://schemas.microsoft.com/office/2006/metadata/properties" xmlns:xsi="http://www.w3.org/2001/XMLSchema-instance" xmlns:pc="http://schemas.microsoft.com/office/infopath/2007/PartnerControls">
-  <documentManagement>
-    <Status xmlns="71af3243-3dd4-4a8d-8c0d-dd76da1f02a5">Not started</Status>
-    <MediaServiceKeyPoints xmlns="71af3243-3dd4-4a8d-8c0d-dd76da1f02a5" xsi:nil="true"/>
-  </documentManagement>
-</p:properties>
-</file>
-
 <file path=customXml/item3.xml><?xml version="1.0" encoding="utf-8"?>
 <?mso-contentType ?>
 <FormTemplates xmlns="http://schemas.microsoft.com/sharepoint/v3/contenttype/forms">
@@ -10525,6 +11913,16 @@
 </file>
 
 <file path=customXml/itemProps1.xml><?xml version="1.0" encoding="utf-8"?>
+<ds:datastoreItem xmlns:ds="http://schemas.openxmlformats.org/officeDocument/2006/customXml" ds:itemID="{ADC43B05-D266-4257-98DE-FF9D8CEDAE76}">
+  <ds:schemaRefs>
+    <ds:schemaRef ds:uri="71af3243-3dd4-4a8d-8c0d-dd76da1f02a5"/>
+    <ds:schemaRef ds:uri="http://schemas.microsoft.com/office/2006/metadata/properties"/>
+    <ds:schemaRef ds:uri="http://schemas.microsoft.com/office/infopath/2007/PartnerControls"/>
+  </ds:schemaRefs>
+</ds:datastoreItem>
+</file>
+
+<file path=customXml/itemProps2.xml><?xml version="1.0" encoding="utf-8"?>
 <ds:datastoreItem xmlns:ds="http://schemas.openxmlformats.org/officeDocument/2006/customXml" ds:itemID="{EB17DF47-B23F-4BE1-BFEA-606A2B278818}">
   <ds:schemaRefs>
     <ds:schemaRef ds:uri="16c05727-aa75-4e4a-9b5f-8a80a1165891"/>
@@ -10543,16 +11941,6 @@
 </ds:datastoreItem>
 </file>
 
-<file path=customXml/itemProps2.xml><?xml version="1.0" encoding="utf-8"?>
-<ds:datastoreItem xmlns:ds="http://schemas.openxmlformats.org/officeDocument/2006/customXml" ds:itemID="{ADC43B05-D266-4257-98DE-FF9D8CEDAE76}">
-  <ds:schemaRefs>
-    <ds:schemaRef ds:uri="71af3243-3dd4-4a8d-8c0d-dd76da1f02a5"/>
-    <ds:schemaRef ds:uri="http://schemas.microsoft.com/office/2006/metadata/properties"/>
-    <ds:schemaRef ds:uri="http://schemas.microsoft.com/office/infopath/2007/PartnerControls"/>
-  </ds:schemaRefs>
-</ds:datastoreItem>
-</file>
-
 <file path=customXml/itemProps3.xml><?xml version="1.0" encoding="utf-8"?>
 <ds:datastoreItem xmlns:ds="http://schemas.openxmlformats.org/officeDocument/2006/customXml" ds:itemID="{8435A0B9-5F49-415F-9BEE-591FDACE98D1}">
   <ds:schemaRefs>

</xml_diff>